<commit_message>
añadidos archivos sql, modificaciones en presentacion e informe
</commit_message>
<xml_diff>
--- a/Clínica Medica.pptx
+++ b/Clínica Medica.pptx
@@ -315,7 +315,7 @@
             <a:fld id="{B61BEF0D-F0BB-DE4B-95CE-6DB70DBA9567}" type="datetimeFigureOut">
               <a:rPr lang="en-US" dirty="0"/>
               <a:pPr/>
-              <a:t>6/2/2025</a:t>
+              <a:t>6/3/2025</a:t>
             </a:fld>
             <a:endParaRPr lang="en-US" dirty="0"/>
           </a:p>
@@ -650,7 +650,7 @@
             <a:fld id="{B61BEF0D-F0BB-DE4B-95CE-6DB70DBA9567}" type="datetimeFigureOut">
               <a:rPr lang="en-US" dirty="0"/>
               <a:pPr/>
-              <a:t>6/2/2025</a:t>
+              <a:t>6/3/2025</a:t>
             </a:fld>
             <a:endParaRPr lang="en-US" dirty="0"/>
           </a:p>
@@ -1048,7 +1048,7 @@
             <a:fld id="{B61BEF0D-F0BB-DE4B-95CE-6DB70DBA9567}" type="datetimeFigureOut">
               <a:rPr lang="en-US" dirty="0"/>
               <a:pPr/>
-              <a:t>6/2/2025</a:t>
+              <a:t>6/3/2025</a:t>
             </a:fld>
             <a:endParaRPr lang="en-US" dirty="0"/>
           </a:p>
@@ -1381,7 +1381,7 @@
             <a:fld id="{B61BEF0D-F0BB-DE4B-95CE-6DB70DBA9567}" type="datetimeFigureOut">
               <a:rPr lang="en-US" dirty="0"/>
               <a:pPr/>
-              <a:t>6/2/2025</a:t>
+              <a:t>6/3/2025</a:t>
             </a:fld>
             <a:endParaRPr lang="en-US" dirty="0"/>
           </a:p>
@@ -1698,7 +1698,7 @@
             <a:fld id="{B61BEF0D-F0BB-DE4B-95CE-6DB70DBA9567}" type="datetimeFigureOut">
               <a:rPr lang="en-US" dirty="0"/>
               <a:pPr/>
-              <a:t>6/2/2025</a:t>
+              <a:t>6/3/2025</a:t>
             </a:fld>
             <a:endParaRPr lang="en-US" dirty="0"/>
           </a:p>
@@ -2091,7 +2091,7 @@
             <a:fld id="{B61BEF0D-F0BB-DE4B-95CE-6DB70DBA9567}" type="datetimeFigureOut">
               <a:rPr lang="en-US" dirty="0"/>
               <a:pPr/>
-              <a:t>6/2/2025</a:t>
+              <a:t>6/3/2025</a:t>
             </a:fld>
             <a:endParaRPr lang="en-US" dirty="0"/>
           </a:p>
@@ -2345,7 +2345,7 @@
             <a:fld id="{B61BEF0D-F0BB-DE4B-95CE-6DB70DBA9567}" type="datetimeFigureOut">
               <a:rPr lang="en-US" dirty="0"/>
               <a:pPr/>
-              <a:t>6/2/2025</a:t>
+              <a:t>6/3/2025</a:t>
             </a:fld>
             <a:endParaRPr lang="en-US" dirty="0"/>
           </a:p>
@@ -2604,7 +2604,7 @@
             <a:fld id="{B61BEF0D-F0BB-DE4B-95CE-6DB70DBA9567}" type="datetimeFigureOut">
               <a:rPr lang="en-US" dirty="0"/>
               <a:pPr/>
-              <a:t>6/2/2025</a:t>
+              <a:t>6/3/2025</a:t>
             </a:fld>
             <a:endParaRPr lang="en-US" dirty="0"/>
           </a:p>
@@ -2863,7 +2863,7 @@
             <a:fld id="{B61BEF0D-F0BB-DE4B-95CE-6DB70DBA9567}" type="datetimeFigureOut">
               <a:rPr lang="en-US" dirty="0"/>
               <a:pPr/>
-              <a:t>6/2/2025</a:t>
+              <a:t>6/3/2025</a:t>
             </a:fld>
             <a:endParaRPr lang="en-US" dirty="0"/>
           </a:p>
@@ -3189,7 +3189,7 @@
             <a:fld id="{B61BEF0D-F0BB-DE4B-95CE-6DB70DBA9567}" type="datetimeFigureOut">
               <a:rPr lang="en-US" dirty="0"/>
               <a:pPr/>
-              <a:t>6/2/2025</a:t>
+              <a:t>6/3/2025</a:t>
             </a:fld>
             <a:endParaRPr lang="en-US" dirty="0"/>
           </a:p>
@@ -3509,7 +3509,7 @@
             <a:fld id="{B61BEF0D-F0BB-DE4B-95CE-6DB70DBA9567}" type="datetimeFigureOut">
               <a:rPr lang="en-US" dirty="0"/>
               <a:pPr/>
-              <a:t>6/2/2025</a:t>
+              <a:t>6/3/2025</a:t>
             </a:fld>
             <a:endParaRPr lang="en-US" dirty="0"/>
           </a:p>
@@ -3963,7 +3963,7 @@
             <a:fld id="{B61BEF0D-F0BB-DE4B-95CE-6DB70DBA9567}" type="datetimeFigureOut">
               <a:rPr lang="en-US" dirty="0"/>
               <a:pPr/>
-              <a:t>6/2/2025</a:t>
+              <a:t>6/3/2025</a:t>
             </a:fld>
             <a:endParaRPr lang="en-US" dirty="0"/>
           </a:p>
@@ -4165,7 +4165,7 @@
             <a:fld id="{B61BEF0D-F0BB-DE4B-95CE-6DB70DBA9567}" type="datetimeFigureOut">
               <a:rPr lang="en-US" dirty="0"/>
               <a:pPr/>
-              <a:t>6/2/2025</a:t>
+              <a:t>6/3/2025</a:t>
             </a:fld>
             <a:endParaRPr lang="en-US" dirty="0"/>
           </a:p>
@@ -4339,7 +4339,7 @@
             <a:fld id="{B61BEF0D-F0BB-DE4B-95CE-6DB70DBA9567}" type="datetimeFigureOut">
               <a:rPr lang="en-US" dirty="0"/>
               <a:pPr/>
-              <a:t>6/2/2025</a:t>
+              <a:t>6/3/2025</a:t>
             </a:fld>
             <a:endParaRPr lang="en-US" dirty="0"/>
           </a:p>
@@ -4669,7 +4669,7 @@
             <a:fld id="{B61BEF0D-F0BB-DE4B-95CE-6DB70DBA9567}" type="datetimeFigureOut">
               <a:rPr lang="en-US" dirty="0"/>
               <a:pPr/>
-              <a:t>6/2/2025</a:t>
+              <a:t>6/3/2025</a:t>
             </a:fld>
             <a:endParaRPr lang="en-US" dirty="0"/>
           </a:p>
@@ -4919,7 +4919,7 @@
           </a:lstStyle>
           <a:p>
             <a:r>
-              <a:rPr lang="es-ES"/>
+              <a:rPr lang="es-ES" dirty="0"/>
               <a:t>Haga clic en el icono para agregar una imagen</a:t>
             </a:r>
             <a:endParaRPr lang="en-US" dirty="0"/>
@@ -5011,7 +5011,7 @@
             <a:fld id="{B61BEF0D-F0BB-DE4B-95CE-6DB70DBA9567}" type="datetimeFigureOut">
               <a:rPr lang="en-US" dirty="0"/>
               <a:pPr/>
-              <a:t>6/2/2025</a:t>
+              <a:t>6/3/2025</a:t>
             </a:fld>
             <a:endParaRPr lang="en-US" dirty="0"/>
           </a:p>
@@ -7125,7 +7125,7 @@
             <a:fld id="{B61BEF0D-F0BB-DE4B-95CE-6DB70DBA9567}" type="datetimeFigureOut">
               <a:rPr lang="en-US" dirty="0"/>
               <a:pPr/>
-              <a:t>6/2/2025</a:t>
+              <a:t>6/3/2025</a:t>
             </a:fld>
             <a:endParaRPr lang="en-US" dirty="0"/>
           </a:p>
@@ -7754,35 +7754,203 @@
           </a:p>
         </p:txBody>
       </p:sp>
-      <p:pic>
-        <p:nvPicPr>
-          <p:cNvPr id="5" name="Marcador de contenido 4">
+      <p:sp>
+        <p:nvSpPr>
+          <p:cNvPr id="6" name="CuadroTexto 5">
             <a:extLst>
               <a:ext uri="{FF2B5EF4-FFF2-40B4-BE49-F238E27FC236}">
-                <a16:creationId xmlns:a16="http://schemas.microsoft.com/office/drawing/2014/main" id="{D4512302-96BE-4948-AE92-CAB0A1388E90}"/>
+                <a16:creationId xmlns:a16="http://schemas.microsoft.com/office/drawing/2014/main" id="{991E5390-0304-F75C-6132-2151FC957BC0}"/>
               </a:ext>
             </a:extLst>
           </p:cNvPr>
-          <p:cNvPicPr>
-            <a:picLocks noGrp="1" noChangeAspect="1"/>
-          </p:cNvPicPr>
-          <p:nvPr>
-            <p:ph idx="1"/>
-          </p:nvPr>
-        </p:nvPicPr>
-        <p:blipFill>
-          <a:blip r:embed="rId2"/>
-          <a:stretch>
-            <a:fillRect/>
-          </a:stretch>
-        </p:blipFill>
+          <p:cNvSpPr txBox="1"/>
+          <p:nvPr/>
+        </p:nvSpPr>
         <p:spPr>
           <a:xfrm>
-            <a:off x="2699915" y="2178464"/>
-            <a:ext cx="7106694" cy="4389285"/>
+            <a:off x="4183811" y="2130725"/>
+            <a:ext cx="4899803" cy="3308598"/>
           </a:xfrm>
+          <a:prstGeom prst="rect">
+            <a:avLst/>
+          </a:prstGeom>
         </p:spPr>
-      </p:pic>
+        <p:style>
+          <a:lnRef idx="2">
+            <a:schemeClr val="dk1"/>
+          </a:lnRef>
+          <a:fillRef idx="1">
+            <a:schemeClr val="lt1"/>
+          </a:fillRef>
+          <a:effectRef idx="0">
+            <a:schemeClr val="dk1"/>
+          </a:effectRef>
+          <a:fontRef idx="minor">
+            <a:schemeClr val="dk1"/>
+          </a:fontRef>
+        </p:style>
+        <p:txBody>
+          <a:bodyPr wrap="square" rtlCol="0">
+            <a:spAutoFit/>
+          </a:bodyPr>
+          <a:lstStyle/>
+          <a:p>
+            <a:r>
+              <a:rPr lang="es-AR" sz="1100" dirty="0">
+                <a:latin typeface="Lucida Console" panose="020B0609040504020204" pitchFamily="49" charset="0"/>
+              </a:rPr>
+              <a:t>SELECT</a:t>
+            </a:r>
+          </a:p>
+          <a:p>
+            <a:r>
+              <a:rPr lang="es-AR" sz="1100" dirty="0">
+                <a:latin typeface="Lucida Console" panose="020B0609040504020204" pitchFamily="49" charset="0"/>
+              </a:rPr>
+              <a:t>e.nombre AS especialidad,</a:t>
+            </a:r>
+          </a:p>
+          <a:p>
+            <a:r>
+              <a:rPr lang="es-AR" sz="1100" dirty="0">
+                <a:latin typeface="Lucida Console" panose="020B0609040504020204" pitchFamily="49" charset="0"/>
+              </a:rPr>
+              <a:t>COUNT(*) AS total_cancelados</a:t>
+            </a:r>
+          </a:p>
+          <a:p>
+            <a:r>
+              <a:rPr lang="es-AR" sz="1100" dirty="0">
+                <a:latin typeface="Lucida Console" panose="020B0609040504020204" pitchFamily="49" charset="0"/>
+              </a:rPr>
+              <a:t>FROM</a:t>
+            </a:r>
+          </a:p>
+          <a:p>
+            <a:r>
+              <a:rPr lang="es-AR" sz="1100" dirty="0">
+                <a:latin typeface="Lucida Console" panose="020B0609040504020204" pitchFamily="49" charset="0"/>
+              </a:rPr>
+              <a:t>turno t</a:t>
+            </a:r>
+          </a:p>
+          <a:p>
+            <a:r>
+              <a:rPr lang="es-AR" sz="1100" dirty="0">
+                <a:latin typeface="Lucida Console" panose="020B0609040504020204" pitchFamily="49" charset="0"/>
+              </a:rPr>
+              <a:t>JOIN</a:t>
+            </a:r>
+          </a:p>
+          <a:p>
+            <a:r>
+              <a:rPr lang="es-AR" sz="1100" dirty="0">
+                <a:latin typeface="Lucida Console" panose="020B0609040504020204" pitchFamily="49" charset="0"/>
+              </a:rPr>
+              <a:t>estado es ON t.id_estado = es.id_estado</a:t>
+            </a:r>
+          </a:p>
+          <a:p>
+            <a:r>
+              <a:rPr lang="es-AR" sz="1100" dirty="0">
+                <a:latin typeface="Lucida Console" panose="020B0609040504020204" pitchFamily="49" charset="0"/>
+              </a:rPr>
+              <a:t>JOIN</a:t>
+            </a:r>
+          </a:p>
+          <a:p>
+            <a:r>
+              <a:rPr lang="es-AR" sz="1100" dirty="0">
+                <a:latin typeface="Lucida Console" panose="020B0609040504020204" pitchFamily="49" charset="0"/>
+              </a:rPr>
+              <a:t>medico m ON t.id_medico = m.id_medico</a:t>
+            </a:r>
+          </a:p>
+          <a:p>
+            <a:r>
+              <a:rPr lang="es-AR" sz="1100" dirty="0">
+                <a:latin typeface="Lucida Console" panose="020B0609040504020204" pitchFamily="49" charset="0"/>
+              </a:rPr>
+              <a:t>JOIN</a:t>
+            </a:r>
+          </a:p>
+          <a:p>
+            <a:r>
+              <a:rPr lang="es-AR" sz="1100" dirty="0">
+                <a:latin typeface="Lucida Console" panose="020B0609040504020204" pitchFamily="49" charset="0"/>
+              </a:rPr>
+              <a:t>especialidad e ON m.id_especialidad = e.id_especialidad</a:t>
+            </a:r>
+          </a:p>
+          <a:p>
+            <a:r>
+              <a:rPr lang="es-AR" sz="1100" dirty="0">
+                <a:latin typeface="Lucida Console" panose="020B0609040504020204" pitchFamily="49" charset="0"/>
+              </a:rPr>
+              <a:t>WHERE</a:t>
+            </a:r>
+          </a:p>
+          <a:p>
+            <a:r>
+              <a:rPr lang="es-AR" sz="1100" dirty="0">
+                <a:latin typeface="Lucida Console" panose="020B0609040504020204" pitchFamily="49" charset="0"/>
+              </a:rPr>
+              <a:t>es.nombre = 'Cancelado' AND</a:t>
+            </a:r>
+          </a:p>
+          <a:p>
+            <a:r>
+              <a:rPr lang="es-AR" sz="1100" dirty="0">
+                <a:latin typeface="Lucida Console" panose="020B0609040504020204" pitchFamily="49" charset="0"/>
+              </a:rPr>
+              <a:t>YEAR(t.fecha) = 2023</a:t>
+            </a:r>
+          </a:p>
+          <a:p>
+            <a:r>
+              <a:rPr lang="es-AR" sz="1100" dirty="0">
+                <a:latin typeface="Lucida Console" panose="020B0609040504020204" pitchFamily="49" charset="0"/>
+              </a:rPr>
+              <a:t>GROUP BY</a:t>
+            </a:r>
+          </a:p>
+          <a:p>
+            <a:r>
+              <a:rPr lang="es-AR" sz="1100" dirty="0">
+                <a:latin typeface="Lucida Console" panose="020B0609040504020204" pitchFamily="49" charset="0"/>
+              </a:rPr>
+              <a:t>e.nombre</a:t>
+            </a:r>
+          </a:p>
+          <a:p>
+            <a:r>
+              <a:rPr lang="es-AR" sz="1100" dirty="0">
+                <a:latin typeface="Lucida Console" panose="020B0609040504020204" pitchFamily="49" charset="0"/>
+              </a:rPr>
+              <a:t>ORDER BY</a:t>
+            </a:r>
+          </a:p>
+          <a:p>
+            <a:r>
+              <a:rPr lang="es-AR" sz="1100" dirty="0">
+                <a:latin typeface="Lucida Console" panose="020B0609040504020204" pitchFamily="49" charset="0"/>
+              </a:rPr>
+              <a:t>total_cancelados DESC</a:t>
+            </a:r>
+          </a:p>
+          <a:p>
+            <a:r>
+              <a:rPr lang="es-AR" sz="1100" dirty="0">
+                <a:latin typeface="Lucida Console" panose="020B0609040504020204" pitchFamily="49" charset="0"/>
+              </a:rPr>
+              <a:t>LIMIT 1;</a:t>
+            </a:r>
+            <a:endParaRPr lang="es-AR" dirty="0">
+              <a:latin typeface="Lucida Console" panose="020B0609040504020204" pitchFamily="49" charset="0"/>
+            </a:endParaRPr>
+          </a:p>
+        </p:txBody>
+      </p:sp>
     </p:spTree>
     <p:extLst>
       <p:ext uri="{BB962C8B-B14F-4D97-AF65-F5344CB8AC3E}">
@@ -7841,35 +8009,454 @@
           </a:p>
         </p:txBody>
       </p:sp>
-      <p:pic>
-        <p:nvPicPr>
-          <p:cNvPr id="5" name="Marcador de contenido 4">
+      <p:sp>
+        <p:nvSpPr>
+          <p:cNvPr id="6" name="Cuadro de texto 2">
             <a:extLst>
               <a:ext uri="{FF2B5EF4-FFF2-40B4-BE49-F238E27FC236}">
-                <a16:creationId xmlns:a16="http://schemas.microsoft.com/office/drawing/2014/main" id="{A1BDA474-E00C-401F-9B87-4B41517EC8E5}"/>
+                <a16:creationId xmlns:a16="http://schemas.microsoft.com/office/drawing/2014/main" id="{E4289453-65D6-B2CA-9CD4-4A8CB4C9C718}"/>
               </a:ext>
             </a:extLst>
           </p:cNvPr>
-          <p:cNvPicPr>
-            <a:picLocks noGrp="1" noChangeAspect="1"/>
-          </p:cNvPicPr>
-          <p:nvPr>
-            <p:ph idx="1"/>
-          </p:nvPr>
-        </p:nvPicPr>
-        <p:blipFill>
-          <a:blip r:embed="rId2"/>
-          <a:stretch>
-            <a:fillRect/>
-          </a:stretch>
-        </p:blipFill>
-        <p:spPr>
+          <p:cNvSpPr txBox="1">
+            <a:spLocks noChangeArrowheads="1"/>
+          </p:cNvSpPr>
+          <p:nvPr/>
+        </p:nvSpPr>
+        <p:spPr bwMode="auto">
           <a:xfrm>
-            <a:off x="2977238" y="2223402"/>
-            <a:ext cx="5994484" cy="4010488"/>
+            <a:off x="3413298" y="2132156"/>
+            <a:ext cx="5365403" cy="3071931"/>
           </a:xfrm>
+          <a:prstGeom prst="rect">
+            <a:avLst/>
+          </a:prstGeom>
+          <a:solidFill>
+            <a:srgbClr val="FFFFFF"/>
+          </a:solidFill>
+          <a:ln w="9525">
+            <a:solidFill>
+              <a:srgbClr val="000000"/>
+            </a:solidFill>
+            <a:miter lim="800000"/>
+            <a:headEnd/>
+            <a:tailEnd/>
+          </a:ln>
         </p:spPr>
-      </p:pic>
+        <p:txBody>
+          <a:bodyPr rot="0" vert="horz" wrap="square" lIns="91440" tIns="45720" rIns="91440" bIns="45720" anchor="t" anchorCtr="0">
+            <a:spAutoFit/>
+          </a:bodyPr>
+          <a:lstStyle/>
+          <a:p>
+            <a:pPr algn="just">
+              <a:lnSpc>
+                <a:spcPct val="115000"/>
+              </a:lnSpc>
+              <a:buNone/>
+            </a:pPr>
+            <a:r>
+              <a:rPr lang="es-AR" sz="1000" dirty="0">
+                <a:solidFill>
+                  <a:srgbClr val="000000"/>
+                </a:solidFill>
+                <a:effectLst/>
+                <a:latin typeface="Lucida Console" panose="020B0609040504020204" pitchFamily="49" charset="0"/>
+                <a:ea typeface="Arial" panose="020B0604020202020204" pitchFamily="34" charset="0"/>
+              </a:rPr>
+              <a:t>SELECT</a:t>
+            </a:r>
+            <a:endParaRPr lang="es-AR" sz="1200" dirty="0">
+              <a:effectLst/>
+              <a:latin typeface="Arial" panose="020B0604020202020204" pitchFamily="34" charset="0"/>
+              <a:ea typeface="Arial" panose="020B0604020202020204" pitchFamily="34" charset="0"/>
+            </a:endParaRPr>
+          </a:p>
+          <a:p>
+            <a:pPr algn="just">
+              <a:lnSpc>
+                <a:spcPct val="115000"/>
+              </a:lnSpc>
+              <a:buNone/>
+            </a:pPr>
+            <a:r>
+              <a:rPr lang="es-AR" sz="1000" dirty="0">
+                <a:solidFill>
+                  <a:srgbClr val="000000"/>
+                </a:solidFill>
+                <a:effectLst/>
+                <a:latin typeface="Lucida Console" panose="020B0609040504020204" pitchFamily="49" charset="0"/>
+                <a:ea typeface="Arial" panose="020B0604020202020204" pitchFamily="34" charset="0"/>
+              </a:rPr>
+              <a:t>    m.id_medico,</a:t>
+            </a:r>
+            <a:endParaRPr lang="es-AR" sz="1200" dirty="0">
+              <a:effectLst/>
+              <a:latin typeface="Arial" panose="020B0604020202020204" pitchFamily="34" charset="0"/>
+              <a:ea typeface="Arial" panose="020B0604020202020204" pitchFamily="34" charset="0"/>
+            </a:endParaRPr>
+          </a:p>
+          <a:p>
+            <a:pPr algn="just">
+              <a:lnSpc>
+                <a:spcPct val="115000"/>
+              </a:lnSpc>
+              <a:buNone/>
+            </a:pPr>
+            <a:r>
+              <a:rPr lang="es-AR" sz="1000" dirty="0">
+                <a:solidFill>
+                  <a:srgbClr val="000000"/>
+                </a:solidFill>
+                <a:effectLst/>
+                <a:latin typeface="Lucida Console" panose="020B0609040504020204" pitchFamily="49" charset="0"/>
+                <a:ea typeface="Arial" panose="020B0604020202020204" pitchFamily="34" charset="0"/>
+              </a:rPr>
+              <a:t>    m.nombre AS medico_nombre,</a:t>
+            </a:r>
+            <a:endParaRPr lang="es-AR" sz="1200" dirty="0">
+              <a:effectLst/>
+              <a:latin typeface="Arial" panose="020B0604020202020204" pitchFamily="34" charset="0"/>
+              <a:ea typeface="Arial" panose="020B0604020202020204" pitchFamily="34" charset="0"/>
+            </a:endParaRPr>
+          </a:p>
+          <a:p>
+            <a:pPr algn="just">
+              <a:lnSpc>
+                <a:spcPct val="115000"/>
+              </a:lnSpc>
+              <a:buNone/>
+            </a:pPr>
+            <a:r>
+              <a:rPr lang="es-AR" sz="1000" dirty="0">
+                <a:solidFill>
+                  <a:srgbClr val="000000"/>
+                </a:solidFill>
+                <a:effectLst/>
+                <a:latin typeface="Lucida Console" panose="020B0609040504020204" pitchFamily="49" charset="0"/>
+                <a:ea typeface="Arial" panose="020B0604020202020204" pitchFamily="34" charset="0"/>
+              </a:rPr>
+              <a:t>    m.apellido AS medico_apellido,</a:t>
+            </a:r>
+            <a:endParaRPr lang="es-AR" sz="1200" dirty="0">
+              <a:effectLst/>
+              <a:latin typeface="Arial" panose="020B0604020202020204" pitchFamily="34" charset="0"/>
+              <a:ea typeface="Arial" panose="020B0604020202020204" pitchFamily="34" charset="0"/>
+            </a:endParaRPr>
+          </a:p>
+          <a:p>
+            <a:pPr algn="just">
+              <a:lnSpc>
+                <a:spcPct val="115000"/>
+              </a:lnSpc>
+              <a:buNone/>
+            </a:pPr>
+            <a:r>
+              <a:rPr lang="es-AR" sz="1000" dirty="0">
+                <a:solidFill>
+                  <a:srgbClr val="000000"/>
+                </a:solidFill>
+                <a:effectLst/>
+                <a:latin typeface="Lucida Console" panose="020B0609040504020204" pitchFamily="49" charset="0"/>
+                <a:ea typeface="Arial" panose="020B0604020202020204" pitchFamily="34" charset="0"/>
+              </a:rPr>
+              <a:t>    COUNT(DISTINCT t.id_paciente) AS pacientes_atendidos</a:t>
+            </a:r>
+            <a:endParaRPr lang="es-AR" sz="1200" dirty="0">
+              <a:effectLst/>
+              <a:latin typeface="Arial" panose="020B0604020202020204" pitchFamily="34" charset="0"/>
+              <a:ea typeface="Arial" panose="020B0604020202020204" pitchFamily="34" charset="0"/>
+            </a:endParaRPr>
+          </a:p>
+          <a:p>
+            <a:pPr algn="just">
+              <a:lnSpc>
+                <a:spcPct val="115000"/>
+              </a:lnSpc>
+              <a:buNone/>
+            </a:pPr>
+            <a:r>
+              <a:rPr lang="es-AR" sz="1000" dirty="0">
+                <a:solidFill>
+                  <a:srgbClr val="000000"/>
+                </a:solidFill>
+                <a:effectLst/>
+                <a:latin typeface="Lucida Console" panose="020B0609040504020204" pitchFamily="49" charset="0"/>
+                <a:ea typeface="Arial" panose="020B0604020202020204" pitchFamily="34" charset="0"/>
+              </a:rPr>
+              <a:t>FROM</a:t>
+            </a:r>
+            <a:endParaRPr lang="es-AR" sz="1200" dirty="0">
+              <a:effectLst/>
+              <a:latin typeface="Arial" panose="020B0604020202020204" pitchFamily="34" charset="0"/>
+              <a:ea typeface="Arial" panose="020B0604020202020204" pitchFamily="34" charset="0"/>
+            </a:endParaRPr>
+          </a:p>
+          <a:p>
+            <a:pPr algn="just">
+              <a:lnSpc>
+                <a:spcPct val="115000"/>
+              </a:lnSpc>
+              <a:buNone/>
+            </a:pPr>
+            <a:r>
+              <a:rPr lang="es-AR" sz="1000" dirty="0">
+                <a:solidFill>
+                  <a:srgbClr val="000000"/>
+                </a:solidFill>
+                <a:effectLst/>
+                <a:latin typeface="Lucida Console" panose="020B0609040504020204" pitchFamily="49" charset="0"/>
+                <a:ea typeface="Arial" panose="020B0604020202020204" pitchFamily="34" charset="0"/>
+              </a:rPr>
+              <a:t>    turno t</a:t>
+            </a:r>
+            <a:endParaRPr lang="es-AR" sz="1200" dirty="0">
+              <a:effectLst/>
+              <a:latin typeface="Arial" panose="020B0604020202020204" pitchFamily="34" charset="0"/>
+              <a:ea typeface="Arial" panose="020B0604020202020204" pitchFamily="34" charset="0"/>
+            </a:endParaRPr>
+          </a:p>
+          <a:p>
+            <a:pPr algn="just">
+              <a:lnSpc>
+                <a:spcPct val="115000"/>
+              </a:lnSpc>
+              <a:buNone/>
+            </a:pPr>
+            <a:r>
+              <a:rPr lang="es-AR" sz="1000" dirty="0">
+                <a:solidFill>
+                  <a:srgbClr val="000000"/>
+                </a:solidFill>
+                <a:effectLst/>
+                <a:latin typeface="Lucida Console" panose="020B0609040504020204" pitchFamily="49" charset="0"/>
+                <a:ea typeface="Arial" panose="020B0604020202020204" pitchFamily="34" charset="0"/>
+              </a:rPr>
+              <a:t>JOIN</a:t>
+            </a:r>
+            <a:endParaRPr lang="es-AR" sz="1200" dirty="0">
+              <a:effectLst/>
+              <a:latin typeface="Arial" panose="020B0604020202020204" pitchFamily="34" charset="0"/>
+              <a:ea typeface="Arial" panose="020B0604020202020204" pitchFamily="34" charset="0"/>
+            </a:endParaRPr>
+          </a:p>
+          <a:p>
+            <a:pPr algn="just">
+              <a:lnSpc>
+                <a:spcPct val="115000"/>
+              </a:lnSpc>
+              <a:buNone/>
+            </a:pPr>
+            <a:r>
+              <a:rPr lang="es-AR" sz="1000" dirty="0">
+                <a:solidFill>
+                  <a:srgbClr val="000000"/>
+                </a:solidFill>
+                <a:effectLst/>
+                <a:latin typeface="Lucida Console" panose="020B0609040504020204" pitchFamily="49" charset="0"/>
+                <a:ea typeface="Arial" panose="020B0604020202020204" pitchFamily="34" charset="0"/>
+              </a:rPr>
+              <a:t>    medico m ON t.id_medico = m.id_medico</a:t>
+            </a:r>
+            <a:endParaRPr lang="es-AR" sz="1200" dirty="0">
+              <a:effectLst/>
+              <a:latin typeface="Arial" panose="020B0604020202020204" pitchFamily="34" charset="0"/>
+              <a:ea typeface="Arial" panose="020B0604020202020204" pitchFamily="34" charset="0"/>
+            </a:endParaRPr>
+          </a:p>
+          <a:p>
+            <a:pPr algn="just">
+              <a:lnSpc>
+                <a:spcPct val="115000"/>
+              </a:lnSpc>
+              <a:buNone/>
+            </a:pPr>
+            <a:r>
+              <a:rPr lang="es-AR" sz="1000" dirty="0">
+                <a:solidFill>
+                  <a:srgbClr val="000000"/>
+                </a:solidFill>
+                <a:effectLst/>
+                <a:latin typeface="Lucida Console" panose="020B0609040504020204" pitchFamily="49" charset="0"/>
+                <a:ea typeface="Arial" panose="020B0604020202020204" pitchFamily="34" charset="0"/>
+              </a:rPr>
+              <a:t>JOIN estado e ON t.id_estado = t.id_estado</a:t>
+            </a:r>
+            <a:endParaRPr lang="es-AR" sz="1200" dirty="0">
+              <a:effectLst/>
+              <a:latin typeface="Arial" panose="020B0604020202020204" pitchFamily="34" charset="0"/>
+              <a:ea typeface="Arial" panose="020B0604020202020204" pitchFamily="34" charset="0"/>
+            </a:endParaRPr>
+          </a:p>
+          <a:p>
+            <a:pPr algn="just">
+              <a:lnSpc>
+                <a:spcPct val="115000"/>
+              </a:lnSpc>
+              <a:buNone/>
+            </a:pPr>
+            <a:r>
+              <a:rPr lang="es-AR" sz="1000" dirty="0">
+                <a:solidFill>
+                  <a:srgbClr val="000000"/>
+                </a:solidFill>
+                <a:effectLst/>
+                <a:latin typeface="Lucida Console" panose="020B0609040504020204" pitchFamily="49" charset="0"/>
+                <a:ea typeface="Arial" panose="020B0604020202020204" pitchFamily="34" charset="0"/>
+              </a:rPr>
+              <a:t>WHERE e.nombre = “Confirmado”</a:t>
+            </a:r>
+            <a:endParaRPr lang="es-AR" sz="1200" dirty="0">
+              <a:effectLst/>
+              <a:latin typeface="Arial" panose="020B0604020202020204" pitchFamily="34" charset="0"/>
+              <a:ea typeface="Arial" panose="020B0604020202020204" pitchFamily="34" charset="0"/>
+            </a:endParaRPr>
+          </a:p>
+          <a:p>
+            <a:pPr algn="just">
+              <a:lnSpc>
+                <a:spcPct val="115000"/>
+              </a:lnSpc>
+              <a:buNone/>
+            </a:pPr>
+            <a:r>
+              <a:rPr lang="es-AR" sz="1000" dirty="0">
+                <a:solidFill>
+                  <a:srgbClr val="000000"/>
+                </a:solidFill>
+                <a:effectLst/>
+                <a:latin typeface="Lucida Console" panose="020B0609040504020204" pitchFamily="49" charset="0"/>
+                <a:ea typeface="Arial" panose="020B0604020202020204" pitchFamily="34" charset="0"/>
+              </a:rPr>
+              <a:t>GROUP BY</a:t>
+            </a:r>
+            <a:endParaRPr lang="es-AR" sz="1200" dirty="0">
+              <a:effectLst/>
+              <a:latin typeface="Arial" panose="020B0604020202020204" pitchFamily="34" charset="0"/>
+              <a:ea typeface="Arial" panose="020B0604020202020204" pitchFamily="34" charset="0"/>
+            </a:endParaRPr>
+          </a:p>
+          <a:p>
+            <a:pPr algn="just">
+              <a:lnSpc>
+                <a:spcPct val="115000"/>
+              </a:lnSpc>
+              <a:buNone/>
+            </a:pPr>
+            <a:r>
+              <a:rPr lang="es-AR" sz="1000" dirty="0">
+                <a:solidFill>
+                  <a:srgbClr val="000000"/>
+                </a:solidFill>
+                <a:effectLst/>
+                <a:latin typeface="Lucida Console" panose="020B0609040504020204" pitchFamily="49" charset="0"/>
+                <a:ea typeface="Arial" panose="020B0604020202020204" pitchFamily="34" charset="0"/>
+              </a:rPr>
+              <a:t>    m.id_medico, m.nombre, m.apellido</a:t>
+            </a:r>
+            <a:endParaRPr lang="es-AR" sz="1200" dirty="0">
+              <a:effectLst/>
+              <a:latin typeface="Arial" panose="020B0604020202020204" pitchFamily="34" charset="0"/>
+              <a:ea typeface="Arial" panose="020B0604020202020204" pitchFamily="34" charset="0"/>
+            </a:endParaRPr>
+          </a:p>
+          <a:p>
+            <a:pPr algn="just">
+              <a:lnSpc>
+                <a:spcPct val="115000"/>
+              </a:lnSpc>
+              <a:buNone/>
+            </a:pPr>
+            <a:r>
+              <a:rPr lang="es-AR" sz="1000" dirty="0">
+                <a:solidFill>
+                  <a:srgbClr val="000000"/>
+                </a:solidFill>
+                <a:effectLst/>
+                <a:latin typeface="Lucida Console" panose="020B0609040504020204" pitchFamily="49" charset="0"/>
+                <a:ea typeface="Arial" panose="020B0604020202020204" pitchFamily="34" charset="0"/>
+              </a:rPr>
+              <a:t>HAVING</a:t>
+            </a:r>
+            <a:endParaRPr lang="es-AR" sz="1200" dirty="0">
+              <a:effectLst/>
+              <a:latin typeface="Arial" panose="020B0604020202020204" pitchFamily="34" charset="0"/>
+              <a:ea typeface="Arial" panose="020B0604020202020204" pitchFamily="34" charset="0"/>
+            </a:endParaRPr>
+          </a:p>
+          <a:p>
+            <a:pPr algn="just">
+              <a:lnSpc>
+                <a:spcPct val="115000"/>
+              </a:lnSpc>
+              <a:buNone/>
+            </a:pPr>
+            <a:r>
+              <a:rPr lang="es-AR" sz="1000" dirty="0">
+                <a:solidFill>
+                  <a:srgbClr val="000000"/>
+                </a:solidFill>
+                <a:effectLst/>
+                <a:latin typeface="Lucida Console" panose="020B0609040504020204" pitchFamily="49" charset="0"/>
+                <a:ea typeface="Arial" panose="020B0604020202020204" pitchFamily="34" charset="0"/>
+              </a:rPr>
+              <a:t>    COUNT(DISTINCT t.id_paciente) &gt; 100</a:t>
+            </a:r>
+            <a:endParaRPr lang="es-AR" sz="1200" dirty="0">
+              <a:effectLst/>
+              <a:latin typeface="Arial" panose="020B0604020202020204" pitchFamily="34" charset="0"/>
+              <a:ea typeface="Arial" panose="020B0604020202020204" pitchFamily="34" charset="0"/>
+            </a:endParaRPr>
+          </a:p>
+          <a:p>
+            <a:pPr algn="just">
+              <a:lnSpc>
+                <a:spcPct val="115000"/>
+              </a:lnSpc>
+              <a:buNone/>
+            </a:pPr>
+            <a:r>
+              <a:rPr lang="es-AR" sz="1000" dirty="0">
+                <a:solidFill>
+                  <a:srgbClr val="000000"/>
+                </a:solidFill>
+                <a:effectLst/>
+                <a:latin typeface="Lucida Console" panose="020B0609040504020204" pitchFamily="49" charset="0"/>
+                <a:ea typeface="Arial" panose="020B0604020202020204" pitchFamily="34" charset="0"/>
+              </a:rPr>
+              <a:t>ORDER BY</a:t>
+            </a:r>
+            <a:endParaRPr lang="es-AR" sz="1200" dirty="0">
+              <a:effectLst/>
+              <a:latin typeface="Arial" panose="020B0604020202020204" pitchFamily="34" charset="0"/>
+              <a:ea typeface="Arial" panose="020B0604020202020204" pitchFamily="34" charset="0"/>
+            </a:endParaRPr>
+          </a:p>
+          <a:p>
+            <a:pPr algn="just">
+              <a:lnSpc>
+                <a:spcPct val="115000"/>
+              </a:lnSpc>
+            </a:pPr>
+            <a:r>
+              <a:rPr lang="es-AR" sz="1000" dirty="0">
+                <a:solidFill>
+                  <a:srgbClr val="000000"/>
+                </a:solidFill>
+                <a:effectLst/>
+                <a:latin typeface="Lucida Console" panose="020B0609040504020204" pitchFamily="49" charset="0"/>
+                <a:ea typeface="Arial" panose="020B0604020202020204" pitchFamily="34" charset="0"/>
+              </a:rPr>
+              <a:t>    pacientes_atendidos DESC;</a:t>
+            </a:r>
+            <a:endParaRPr lang="es-AR" sz="1200" dirty="0">
+              <a:effectLst/>
+              <a:latin typeface="Arial" panose="020B0604020202020204" pitchFamily="34" charset="0"/>
+              <a:ea typeface="Arial" panose="020B0604020202020204" pitchFamily="34" charset="0"/>
+            </a:endParaRPr>
+          </a:p>
+        </p:txBody>
+      </p:sp>
     </p:spTree>
     <p:extLst>
       <p:ext uri="{BB962C8B-B14F-4D97-AF65-F5344CB8AC3E}">
@@ -8447,13 +9034,8 @@
           <a:p>
             <a:r>
               <a:rPr lang="es-ES" dirty="0"/>
-              <a:t>- </a:t>
-            </a:r>
-            <a:r>
-              <a:rPr lang="es-ES" dirty="0" err="1"/>
-              <a:t>obra_social</a:t>
-            </a:r>
-            <a:endParaRPr lang="es-ES" dirty="0"/>
+              <a:t>- obra_social</a:t>
+            </a:r>
           </a:p>
           <a:p>
             <a:r>
@@ -8494,13 +9076,8 @@
           <a:p>
             <a:r>
               <a:rPr lang="es-ES" dirty="0"/>
-              <a:t>- enfermedades </a:t>
-            </a:r>
-            <a:r>
-              <a:rPr lang="es-ES" dirty="0" err="1"/>
-              <a:t>cronicas</a:t>
-            </a:r>
-            <a:endParaRPr lang="es-ES" dirty="0"/>
+              <a:t>- enfermedades cronicas</a:t>
+            </a:r>
           </a:p>
         </p:txBody>
       </p:sp>
@@ -8751,7 +9328,7 @@
           </a:lstStyle>
           <a:p>
             <a:r>
-              <a:rPr lang="es-ES" dirty="0" err="1"/>
+              <a:rPr lang="es-ES" dirty="0"/>
               <a:t>pacientes_enfermedades_cronicas</a:t>
             </a:r>
             <a:endParaRPr lang="es-ES" sz="2000" dirty="0"/>
@@ -8759,24 +9336,14 @@
           <a:p>
             <a:r>
               <a:rPr lang="es-ES" dirty="0"/>
-              <a:t>- evoluciones </a:t>
-            </a:r>
-            <a:r>
-              <a:rPr lang="es-ES" dirty="0" err="1"/>
-              <a:t>clinicas</a:t>
-            </a:r>
-            <a:endParaRPr lang="es-ES" dirty="0"/>
+              <a:t>- evoluciones clinicas</a:t>
+            </a:r>
           </a:p>
           <a:p>
             <a:r>
               <a:rPr lang="es-ES" dirty="0"/>
-              <a:t>- </a:t>
-            </a:r>
-            <a:r>
-              <a:rPr lang="es-ES" dirty="0" err="1"/>
-              <a:t>obra_social</a:t>
-            </a:r>
-            <a:endParaRPr lang="es-ES" dirty="0"/>
+              <a:t>- obra_social</a:t>
+            </a:r>
           </a:p>
         </p:txBody>
       </p:sp>
@@ -8840,10 +9407,10 @@
       </p:sp>
       <p:pic>
         <p:nvPicPr>
-          <p:cNvPr id="6" name="Marcador de contenido 5">
+          <p:cNvPr id="7" name="Marcador de contenido 6" descr="Diagrama">
             <a:extLst>
               <a:ext uri="{FF2B5EF4-FFF2-40B4-BE49-F238E27FC236}">
-                <a16:creationId xmlns:a16="http://schemas.microsoft.com/office/drawing/2014/main" id="{B7211E87-32A2-4825-B096-17F2E3B02810}"/>
+                <a16:creationId xmlns:a16="http://schemas.microsoft.com/office/drawing/2014/main" id="{C93C6D0A-D41B-5BFE-AEE8-36C6C462D3DB}"/>
               </a:ext>
             </a:extLst>
           </p:cNvPr>
@@ -8855,30 +9422,16 @@
           </p:nvPr>
         </p:nvPicPr>
         <p:blipFill>
-          <a:blip r:embed="rId2">
-            <a:extLst>
-              <a:ext uri="{28A0092B-C50C-407E-A947-70E740481C1C}">
-                <a14:useLocalDpi xmlns:a14="http://schemas.microsoft.com/office/drawing/2010/main" val="0"/>
-              </a:ext>
-            </a:extLst>
-          </a:blip>
-          <a:srcRect/>
+          <a:blip r:embed="rId2"/>
           <a:stretch>
             <a:fillRect/>
           </a:stretch>
         </p:blipFill>
-        <p:spPr bwMode="auto">
+        <p:spPr>
           <a:xfrm>
-            <a:off x="3003190" y="1370495"/>
-            <a:ext cx="7491979" cy="5273388"/>
+            <a:off x="4600876" y="1458397"/>
+            <a:ext cx="4406695" cy="5188330"/>
           </a:xfrm>
-          <a:prstGeom prst="rect">
-            <a:avLst/>
-          </a:prstGeom>
-          <a:noFill/>
-          <a:ln>
-            <a:noFill/>
-          </a:ln>
         </p:spPr>
       </p:pic>
     </p:spTree>
@@ -8939,282 +9492,35 @@
           </a:p>
         </p:txBody>
       </p:sp>
-      <p:sp>
-        <p:nvSpPr>
-          <p:cNvPr id="3" name="Marcador de contenido 2">
+      <p:pic>
+        <p:nvPicPr>
+          <p:cNvPr id="9" name="Marcador de contenido 8" descr="Escala de tiempo">
             <a:extLst>
               <a:ext uri="{FF2B5EF4-FFF2-40B4-BE49-F238E27FC236}">
-                <a16:creationId xmlns:a16="http://schemas.microsoft.com/office/drawing/2014/main" id="{B6C8F823-229A-44F3-83A1-90707C09FBBF}"/>
+                <a16:creationId xmlns:a16="http://schemas.microsoft.com/office/drawing/2014/main" id="{D3D031D6-7A84-EFBE-CA1E-26E8CFB42463}"/>
               </a:ext>
             </a:extLst>
           </p:cNvPr>
-          <p:cNvSpPr>
-            <a:spLocks noGrp="1"/>
-          </p:cNvSpPr>
+          <p:cNvPicPr>
+            <a:picLocks noGrp="1" noChangeAspect="1"/>
+          </p:cNvPicPr>
           <p:nvPr>
             <p:ph idx="1"/>
           </p:nvPr>
-        </p:nvSpPr>
+        </p:nvPicPr>
+        <p:blipFill>
+          <a:blip r:embed="rId2"/>
+          <a:stretch>
+            <a:fillRect/>
+          </a:stretch>
+        </p:blipFill>
         <p:spPr>
           <a:xfrm>
-            <a:off x="2589212" y="2133600"/>
-            <a:ext cx="8915400" cy="2228675"/>
+            <a:off x="3554131" y="1377975"/>
+            <a:ext cx="6989274" cy="5315433"/>
           </a:xfrm>
         </p:spPr>
-        <p:txBody>
-          <a:bodyPr/>
-          <a:lstStyle/>
-          <a:p>
-            <a:pPr rtl="0" fontAlgn="base">
-              <a:spcBef>
-                <a:spcPts val="1200"/>
-              </a:spcBef>
-              <a:spcAft>
-                <a:spcPts val="0"/>
-              </a:spcAft>
-              <a:buFont typeface="Arial" panose="020B0604020202020204" pitchFamily="34" charset="0"/>
-              <a:buChar char="•"/>
-            </a:pPr>
-            <a:r>
-              <a:rPr lang="es-ES" sz="1800" b="0" i="0" u="none" strike="noStrike" dirty="0">
-                <a:solidFill>
-                  <a:srgbClr val="000000"/>
-                </a:solidFill>
-                <a:effectLst/>
-                <a:latin typeface="Lexend"/>
-              </a:rPr>
-              <a:t>Hecho central: </a:t>
-            </a:r>
-            <a:r>
-              <a:rPr lang="es-ES" sz="1800" b="1" i="0" u="none" strike="noStrike" dirty="0" err="1">
-                <a:solidFill>
-                  <a:srgbClr val="188038"/>
-                </a:solidFill>
-                <a:effectLst/>
-                <a:latin typeface="Lexend"/>
-              </a:rPr>
-              <a:t>fact_turno</a:t>
-            </a:r>
-            <a:endParaRPr lang="es-ES" sz="1800" b="0" i="0" u="none" strike="noStrike" dirty="0">
-              <a:solidFill>
-                <a:srgbClr val="000000"/>
-              </a:solidFill>
-              <a:effectLst/>
-              <a:latin typeface="Arial" panose="020B0604020202020204" pitchFamily="34" charset="0"/>
-            </a:endParaRPr>
-          </a:p>
-          <a:p>
-            <a:pPr rtl="0" fontAlgn="base">
-              <a:spcBef>
-                <a:spcPts val="0"/>
-              </a:spcBef>
-              <a:spcAft>
-                <a:spcPts val="0"/>
-              </a:spcAft>
-              <a:buFont typeface="Arial" panose="020B0604020202020204" pitchFamily="34" charset="0"/>
-              <a:buChar char="•"/>
-            </a:pPr>
-            <a:r>
-              <a:rPr lang="es-ES" sz="1800" b="0" i="0" u="none" strike="noStrike" dirty="0">
-                <a:solidFill>
-                  <a:srgbClr val="000000"/>
-                </a:solidFill>
-                <a:effectLst/>
-                <a:latin typeface="Lexend"/>
-              </a:rPr>
-              <a:t>Dimensiones: </a:t>
-            </a:r>
-            <a:r>
-              <a:rPr lang="es-ES" sz="1800" b="1" i="0" u="none" strike="noStrike" dirty="0" err="1">
-                <a:solidFill>
-                  <a:srgbClr val="188038"/>
-                </a:solidFill>
-                <a:effectLst/>
-                <a:latin typeface="Lexend"/>
-              </a:rPr>
-              <a:t>dim_paciente</a:t>
-            </a:r>
-            <a:r>
-              <a:rPr lang="es-ES" sz="1800" b="0" i="0" u="none" strike="noStrike" dirty="0">
-                <a:solidFill>
-                  <a:srgbClr val="000000"/>
-                </a:solidFill>
-                <a:effectLst/>
-                <a:latin typeface="Lexend"/>
-              </a:rPr>
-              <a:t>, </a:t>
-            </a:r>
-            <a:r>
-              <a:rPr lang="es-ES" sz="1800" b="1" i="0" u="none" strike="noStrike" dirty="0" err="1">
-                <a:solidFill>
-                  <a:srgbClr val="188038"/>
-                </a:solidFill>
-                <a:effectLst/>
-                <a:latin typeface="Lexend"/>
-              </a:rPr>
-              <a:t>dim_medico</a:t>
-            </a:r>
-            <a:r>
-              <a:rPr lang="es-ES" sz="1800" b="0" i="0" u="none" strike="noStrike" dirty="0">
-                <a:solidFill>
-                  <a:srgbClr val="000000"/>
-                </a:solidFill>
-                <a:effectLst/>
-                <a:latin typeface="Lexend"/>
-              </a:rPr>
-              <a:t>, </a:t>
-            </a:r>
-            <a:r>
-              <a:rPr lang="es-ES" sz="1800" b="1" i="0" u="none" strike="noStrike" dirty="0" err="1">
-                <a:solidFill>
-                  <a:srgbClr val="188038"/>
-                </a:solidFill>
-                <a:effectLst/>
-                <a:latin typeface="Lexend"/>
-              </a:rPr>
-              <a:t>dim_especialidad</a:t>
-            </a:r>
-            <a:r>
-              <a:rPr lang="es-ES" sz="1800" b="0" i="0" u="none" strike="noStrike" dirty="0">
-                <a:solidFill>
-                  <a:srgbClr val="000000"/>
-                </a:solidFill>
-                <a:effectLst/>
-                <a:latin typeface="Lexend"/>
-              </a:rPr>
-              <a:t>, </a:t>
-            </a:r>
-            <a:r>
-              <a:rPr lang="es-ES" sz="1800" b="1" i="0" u="none" strike="noStrike" dirty="0" err="1">
-                <a:solidFill>
-                  <a:srgbClr val="188038"/>
-                </a:solidFill>
-                <a:effectLst/>
-                <a:latin typeface="Lexend"/>
-              </a:rPr>
-              <a:t>dim_sede</a:t>
-            </a:r>
-            <a:r>
-              <a:rPr lang="es-ES" sz="1800" b="0" i="0" u="none" strike="noStrike" dirty="0">
-                <a:solidFill>
-                  <a:srgbClr val="000000"/>
-                </a:solidFill>
-                <a:effectLst/>
-                <a:latin typeface="Lexend"/>
-              </a:rPr>
-              <a:t>, </a:t>
-            </a:r>
-            <a:r>
-              <a:rPr lang="es-ES" sz="1800" b="1" i="0" u="none" strike="noStrike" dirty="0" err="1">
-                <a:solidFill>
-                  <a:srgbClr val="188038"/>
-                </a:solidFill>
-                <a:effectLst/>
-                <a:latin typeface="Lexend"/>
-              </a:rPr>
-              <a:t>dim_fecha</a:t>
-            </a:r>
-            <a:r>
-              <a:rPr lang="es-ES" sz="1800" b="0" i="0" u="none" strike="noStrike" dirty="0">
-                <a:solidFill>
-                  <a:srgbClr val="000000"/>
-                </a:solidFill>
-                <a:effectLst/>
-                <a:latin typeface="Lexend"/>
-              </a:rPr>
-              <a:t>, </a:t>
-            </a:r>
-            <a:r>
-              <a:rPr lang="es-ES" sz="1800" b="1" i="0" u="none" strike="noStrike" dirty="0" err="1">
-                <a:solidFill>
-                  <a:srgbClr val="188038"/>
-                </a:solidFill>
-                <a:effectLst/>
-                <a:latin typeface="Lexend"/>
-              </a:rPr>
-              <a:t>dim_estado</a:t>
-            </a:r>
-            <a:endParaRPr lang="es-ES" sz="1800" b="0" i="0" u="none" strike="noStrike" dirty="0">
-              <a:solidFill>
-                <a:srgbClr val="000000"/>
-              </a:solidFill>
-              <a:effectLst/>
-              <a:latin typeface="Arial" panose="020B0604020202020204" pitchFamily="34" charset="0"/>
-            </a:endParaRPr>
-          </a:p>
-          <a:p>
-            <a:pPr rtl="0" fontAlgn="base">
-              <a:spcBef>
-                <a:spcPts val="0"/>
-              </a:spcBef>
-              <a:spcAft>
-                <a:spcPts val="1200"/>
-              </a:spcAft>
-              <a:buFont typeface="Arial" panose="020B0604020202020204" pitchFamily="34" charset="0"/>
-              <a:buChar char="•"/>
-            </a:pPr>
-            <a:r>
-              <a:rPr lang="es-ES" sz="1800" b="0" i="0" u="none" strike="noStrike" dirty="0">
-                <a:solidFill>
-                  <a:srgbClr val="000000"/>
-                </a:solidFill>
-                <a:effectLst/>
-                <a:latin typeface="Lexend"/>
-              </a:rPr>
-              <a:t>Relaciones: 1:N desde cada dimensión a </a:t>
-            </a:r>
-            <a:r>
-              <a:rPr lang="es-ES" sz="1800" b="1" i="0" u="none" strike="noStrike" dirty="0" err="1">
-                <a:solidFill>
-                  <a:srgbClr val="188038"/>
-                </a:solidFill>
-                <a:effectLst/>
-                <a:latin typeface="Lexend"/>
-              </a:rPr>
-              <a:t>fact_turno</a:t>
-            </a:r>
-            <a:endParaRPr lang="es-ES" sz="1800" b="0" i="0" u="none" strike="noStrike" dirty="0">
-              <a:solidFill>
-                <a:srgbClr val="000000"/>
-              </a:solidFill>
-              <a:effectLst/>
-              <a:latin typeface="Arial" panose="020B0604020202020204" pitchFamily="34" charset="0"/>
-            </a:endParaRPr>
-          </a:p>
-          <a:p>
-            <a:pPr rtl="0" fontAlgn="base">
-              <a:spcBef>
-                <a:spcPts val="1200"/>
-              </a:spcBef>
-              <a:spcAft>
-                <a:spcPts val="0"/>
-              </a:spcAft>
-              <a:buFont typeface="Arial" panose="020B0604020202020204" pitchFamily="34" charset="0"/>
-              <a:buChar char="•"/>
-            </a:pPr>
-            <a:r>
-              <a:rPr lang="es-ES" sz="1800" b="0" i="0" u="none" strike="noStrike" dirty="0">
-                <a:solidFill>
-                  <a:srgbClr val="000000"/>
-                </a:solidFill>
-                <a:effectLst/>
-                <a:latin typeface="Lexend"/>
-              </a:rPr>
-              <a:t>Tipo de esquema: Estrella (dimensiones desnormalizadas)</a:t>
-            </a:r>
-            <a:endParaRPr lang="es-ES" sz="1800" b="0" i="0" u="none" strike="noStrike" dirty="0">
-              <a:solidFill>
-                <a:srgbClr val="000000"/>
-              </a:solidFill>
-              <a:effectLst/>
-              <a:latin typeface="Arial" panose="020B0604020202020204" pitchFamily="34" charset="0"/>
-            </a:endParaRPr>
-          </a:p>
-          <a:p>
-            <a:endParaRPr lang="es-ES" dirty="0"/>
-          </a:p>
-        </p:txBody>
-      </p:sp>
+      </p:pic>
     </p:spTree>
     <p:extLst>
       <p:ext uri="{BB962C8B-B14F-4D97-AF65-F5344CB8AC3E}">
@@ -9563,70 +9869,1347 @@
             <a:pPr algn="ctr"/>
             <a:r>
               <a:rPr lang="es-ES" dirty="0"/>
-              <a:t>Vista de evoluciones Clínicas para médicos.</a:t>
+              <a:t>Vista de turnos y evoluciones Clínicas para médicos.</a:t>
             </a:r>
           </a:p>
         </p:txBody>
       </p:sp>
-      <p:pic>
-        <p:nvPicPr>
-          <p:cNvPr id="5" name="Marcador de contenido 4">
+      <p:sp>
+        <p:nvSpPr>
+          <p:cNvPr id="3" name="Cuadro de texto 2">
             <a:extLst>
               <a:ext uri="{FF2B5EF4-FFF2-40B4-BE49-F238E27FC236}">
-                <a16:creationId xmlns:a16="http://schemas.microsoft.com/office/drawing/2014/main" id="{C992038D-7898-44B8-B51B-68DAD0A16130}"/>
+                <a16:creationId xmlns:a16="http://schemas.microsoft.com/office/drawing/2014/main" id="{CBCE1047-ACE6-9FAC-271D-B395EC369C0A}"/>
               </a:ext>
             </a:extLst>
           </p:cNvPr>
-          <p:cNvPicPr>
-            <a:picLocks noGrp="1" noChangeAspect="1"/>
-          </p:cNvPicPr>
-          <p:nvPr>
-            <p:ph idx="1"/>
-          </p:nvPr>
-        </p:nvPicPr>
-        <p:blipFill>
-          <a:blip r:embed="rId2"/>
-          <a:stretch>
-            <a:fillRect/>
-          </a:stretch>
-        </p:blipFill>
-        <p:spPr>
+          <p:cNvSpPr txBox="1">
+            <a:spLocks noChangeArrowheads="1"/>
+          </p:cNvSpPr>
+          <p:nvPr/>
+        </p:nvSpPr>
+        <p:spPr bwMode="auto">
           <a:xfrm>
-            <a:off x="5622708" y="2059437"/>
-            <a:ext cx="2355102" cy="2993084"/>
-          </a:xfrm>
-        </p:spPr>
-      </p:pic>
-      <p:pic>
-        <p:nvPicPr>
-          <p:cNvPr id="4" name="Imagen 3">
-            <a:extLst>
-              <a:ext uri="{FF2B5EF4-FFF2-40B4-BE49-F238E27FC236}">
-                <a16:creationId xmlns:a16="http://schemas.microsoft.com/office/drawing/2014/main" id="{55EA8497-F59D-4D77-B6EE-6AC0430ED030}"/>
-              </a:ext>
-            </a:extLst>
-          </p:cNvPr>
-          <p:cNvPicPr>
-            <a:picLocks noChangeAspect="1"/>
-          </p:cNvPicPr>
-          <p:nvPr/>
-        </p:nvPicPr>
-        <p:blipFill>
-          <a:blip r:embed="rId3"/>
-          <a:stretch>
-            <a:fillRect/>
-          </a:stretch>
-        </p:blipFill>
-        <p:spPr>
-          <a:xfrm>
-            <a:off x="1774788" y="5374983"/>
-            <a:ext cx="9966639" cy="764613"/>
+            <a:off x="1760017" y="1905000"/>
+            <a:ext cx="4237990" cy="3868303"/>
           </a:xfrm>
           <a:prstGeom prst="rect">
             <a:avLst/>
           </a:prstGeom>
+          <a:ln>
+            <a:headEnd/>
+            <a:tailEnd/>
+          </a:ln>
         </p:spPr>
-      </p:pic>
+        <p:style>
+          <a:lnRef idx="2">
+            <a:schemeClr val="accent1"/>
+          </a:lnRef>
+          <a:fillRef idx="1">
+            <a:schemeClr val="lt1"/>
+          </a:fillRef>
+          <a:effectRef idx="0">
+            <a:schemeClr val="accent1"/>
+          </a:effectRef>
+          <a:fontRef idx="minor">
+            <a:schemeClr val="dk1"/>
+          </a:fontRef>
+        </p:style>
+        <p:txBody>
+          <a:bodyPr rot="0" vert="horz" wrap="square" lIns="91440" tIns="45720" rIns="91440" bIns="45720" anchor="t" anchorCtr="0">
+            <a:spAutoFit/>
+          </a:bodyPr>
+          <a:lstStyle/>
+          <a:p>
+            <a:pPr algn="just">
+              <a:lnSpc>
+                <a:spcPct val="115000"/>
+              </a:lnSpc>
+              <a:buNone/>
+            </a:pPr>
+            <a:r>
+              <a:rPr lang="es-AR" sz="800" kern="1100" dirty="0">
+                <a:solidFill>
+                  <a:srgbClr val="000000"/>
+                </a:solidFill>
+                <a:effectLst/>
+                <a:latin typeface="Lucida Console" panose="020B0609040504020204" pitchFamily="49" charset="0"/>
+                <a:ea typeface="Arial" panose="020B0604020202020204" pitchFamily="34" charset="0"/>
+              </a:rPr>
+              <a:t>CREATE VIEW vista_evoluciones_medicas AS</a:t>
+            </a:r>
+            <a:endParaRPr lang="es-AR" sz="1050" kern="1100" dirty="0">
+              <a:effectLst/>
+              <a:latin typeface="Arial" panose="020B0604020202020204" pitchFamily="34" charset="0"/>
+              <a:ea typeface="Arial" panose="020B0604020202020204" pitchFamily="34" charset="0"/>
+            </a:endParaRPr>
+          </a:p>
+          <a:p>
+            <a:pPr algn="just">
+              <a:lnSpc>
+                <a:spcPct val="115000"/>
+              </a:lnSpc>
+              <a:buNone/>
+            </a:pPr>
+            <a:r>
+              <a:rPr lang="es-AR" sz="800" kern="1100" dirty="0">
+                <a:solidFill>
+                  <a:srgbClr val="000000"/>
+                </a:solidFill>
+                <a:effectLst/>
+                <a:latin typeface="Lucida Console" panose="020B0609040504020204" pitchFamily="49" charset="0"/>
+                <a:ea typeface="Arial" panose="020B0604020202020204" pitchFamily="34" charset="0"/>
+              </a:rPr>
+              <a:t>SELECT</a:t>
+            </a:r>
+            <a:endParaRPr lang="es-AR" sz="1050" kern="1100" dirty="0">
+              <a:effectLst/>
+              <a:latin typeface="Arial" panose="020B0604020202020204" pitchFamily="34" charset="0"/>
+              <a:ea typeface="Arial" panose="020B0604020202020204" pitchFamily="34" charset="0"/>
+            </a:endParaRPr>
+          </a:p>
+          <a:p>
+            <a:pPr algn="just">
+              <a:lnSpc>
+                <a:spcPct val="115000"/>
+              </a:lnSpc>
+              <a:buNone/>
+            </a:pPr>
+            <a:r>
+              <a:rPr lang="es-AR" sz="800" kern="1100" dirty="0">
+                <a:solidFill>
+                  <a:srgbClr val="000000"/>
+                </a:solidFill>
+                <a:effectLst/>
+                <a:latin typeface="Lucida Console" panose="020B0609040504020204" pitchFamily="49" charset="0"/>
+                <a:ea typeface="Arial" panose="020B0604020202020204" pitchFamily="34" charset="0"/>
+              </a:rPr>
+              <a:t>    ec.id_evolucion,</a:t>
+            </a:r>
+            <a:endParaRPr lang="es-AR" sz="1050" kern="1100" dirty="0">
+              <a:effectLst/>
+              <a:latin typeface="Arial" panose="020B0604020202020204" pitchFamily="34" charset="0"/>
+              <a:ea typeface="Arial" panose="020B0604020202020204" pitchFamily="34" charset="0"/>
+            </a:endParaRPr>
+          </a:p>
+          <a:p>
+            <a:pPr algn="just">
+              <a:lnSpc>
+                <a:spcPct val="115000"/>
+              </a:lnSpc>
+              <a:buNone/>
+            </a:pPr>
+            <a:r>
+              <a:rPr lang="es-AR" sz="800" kern="1100" dirty="0">
+                <a:solidFill>
+                  <a:srgbClr val="000000"/>
+                </a:solidFill>
+                <a:effectLst/>
+                <a:latin typeface="Lucida Console" panose="020B0609040504020204" pitchFamily="49" charset="0"/>
+                <a:ea typeface="Arial" panose="020B0604020202020204" pitchFamily="34" charset="0"/>
+              </a:rPr>
+              <a:t>    ec.fecha_evolucion,</a:t>
+            </a:r>
+            <a:endParaRPr lang="es-AR" sz="1050" kern="1100" dirty="0">
+              <a:effectLst/>
+              <a:latin typeface="Arial" panose="020B0604020202020204" pitchFamily="34" charset="0"/>
+              <a:ea typeface="Arial" panose="020B0604020202020204" pitchFamily="34" charset="0"/>
+            </a:endParaRPr>
+          </a:p>
+          <a:p>
+            <a:pPr algn="just">
+              <a:lnSpc>
+                <a:spcPct val="115000"/>
+              </a:lnSpc>
+              <a:buNone/>
+            </a:pPr>
+            <a:r>
+              <a:rPr lang="es-AR" sz="800" kern="1100" dirty="0">
+                <a:solidFill>
+                  <a:srgbClr val="000000"/>
+                </a:solidFill>
+                <a:effectLst/>
+                <a:latin typeface="Lucida Console" panose="020B0609040504020204" pitchFamily="49" charset="0"/>
+                <a:ea typeface="Arial" panose="020B0604020202020204" pitchFamily="34" charset="0"/>
+              </a:rPr>
+              <a:t>    ec.tipo_evolucion,</a:t>
+            </a:r>
+            <a:endParaRPr lang="es-AR" sz="1050" kern="1100" dirty="0">
+              <a:effectLst/>
+              <a:latin typeface="Arial" panose="020B0604020202020204" pitchFamily="34" charset="0"/>
+              <a:ea typeface="Arial" panose="020B0604020202020204" pitchFamily="34" charset="0"/>
+            </a:endParaRPr>
+          </a:p>
+          <a:p>
+            <a:pPr algn="just">
+              <a:lnSpc>
+                <a:spcPct val="115000"/>
+              </a:lnSpc>
+              <a:buNone/>
+            </a:pPr>
+            <a:r>
+              <a:rPr lang="es-AR" sz="800" kern="1100" dirty="0">
+                <a:solidFill>
+                  <a:srgbClr val="000000"/>
+                </a:solidFill>
+                <a:effectLst/>
+                <a:latin typeface="Lucida Console" panose="020B0609040504020204" pitchFamily="49" charset="0"/>
+                <a:ea typeface="Arial" panose="020B0604020202020204" pitchFamily="34" charset="0"/>
+              </a:rPr>
+              <a:t>    ec.motivo,</a:t>
+            </a:r>
+            <a:endParaRPr lang="es-AR" sz="1050" kern="1100" dirty="0">
+              <a:effectLst/>
+              <a:latin typeface="Arial" panose="020B0604020202020204" pitchFamily="34" charset="0"/>
+              <a:ea typeface="Arial" panose="020B0604020202020204" pitchFamily="34" charset="0"/>
+            </a:endParaRPr>
+          </a:p>
+          <a:p>
+            <a:pPr algn="just">
+              <a:lnSpc>
+                <a:spcPct val="115000"/>
+              </a:lnSpc>
+              <a:buNone/>
+            </a:pPr>
+            <a:r>
+              <a:rPr lang="es-AR" sz="800" kern="1100" dirty="0">
+                <a:solidFill>
+                  <a:srgbClr val="000000"/>
+                </a:solidFill>
+                <a:effectLst/>
+                <a:latin typeface="Lucida Console" panose="020B0609040504020204" pitchFamily="49" charset="0"/>
+                <a:ea typeface="Arial" panose="020B0604020202020204" pitchFamily="34" charset="0"/>
+              </a:rPr>
+              <a:t>    ec.observaciones,</a:t>
+            </a:r>
+            <a:endParaRPr lang="es-AR" sz="1050" kern="1100" dirty="0">
+              <a:effectLst/>
+              <a:latin typeface="Arial" panose="020B0604020202020204" pitchFamily="34" charset="0"/>
+              <a:ea typeface="Arial" panose="020B0604020202020204" pitchFamily="34" charset="0"/>
+            </a:endParaRPr>
+          </a:p>
+          <a:p>
+            <a:pPr algn="just">
+              <a:lnSpc>
+                <a:spcPct val="115000"/>
+              </a:lnSpc>
+              <a:buNone/>
+            </a:pPr>
+            <a:r>
+              <a:rPr lang="es-AR" sz="800" kern="1100" dirty="0">
+                <a:solidFill>
+                  <a:srgbClr val="000000"/>
+                </a:solidFill>
+                <a:effectLst/>
+                <a:latin typeface="Lucida Console" panose="020B0609040504020204" pitchFamily="49" charset="0"/>
+                <a:ea typeface="Arial" panose="020B0604020202020204" pitchFamily="34" charset="0"/>
+              </a:rPr>
+              <a:t>    p.id_paciente,</a:t>
+            </a:r>
+            <a:endParaRPr lang="es-AR" sz="1050" kern="1100" dirty="0">
+              <a:effectLst/>
+              <a:latin typeface="Arial" panose="020B0604020202020204" pitchFamily="34" charset="0"/>
+              <a:ea typeface="Arial" panose="020B0604020202020204" pitchFamily="34" charset="0"/>
+            </a:endParaRPr>
+          </a:p>
+          <a:p>
+            <a:pPr algn="just">
+              <a:lnSpc>
+                <a:spcPct val="115000"/>
+              </a:lnSpc>
+              <a:buNone/>
+            </a:pPr>
+            <a:r>
+              <a:rPr lang="es-AR" sz="800" kern="1100" dirty="0">
+                <a:solidFill>
+                  <a:srgbClr val="000000"/>
+                </a:solidFill>
+                <a:effectLst/>
+                <a:latin typeface="Lucida Console" panose="020B0609040504020204" pitchFamily="49" charset="0"/>
+                <a:ea typeface="Arial" panose="020B0604020202020204" pitchFamily="34" charset="0"/>
+              </a:rPr>
+              <a:t>    p.dni,</a:t>
+            </a:r>
+            <a:endParaRPr lang="es-AR" sz="1050" kern="1100" dirty="0">
+              <a:effectLst/>
+              <a:latin typeface="Arial" panose="020B0604020202020204" pitchFamily="34" charset="0"/>
+              <a:ea typeface="Arial" panose="020B0604020202020204" pitchFamily="34" charset="0"/>
+            </a:endParaRPr>
+          </a:p>
+          <a:p>
+            <a:pPr algn="just">
+              <a:lnSpc>
+                <a:spcPct val="115000"/>
+              </a:lnSpc>
+              <a:buNone/>
+            </a:pPr>
+            <a:r>
+              <a:rPr lang="es-AR" sz="800" kern="1100" dirty="0">
+                <a:solidFill>
+                  <a:srgbClr val="000000"/>
+                </a:solidFill>
+                <a:effectLst/>
+                <a:latin typeface="Lucida Console" panose="020B0609040504020204" pitchFamily="49" charset="0"/>
+                <a:ea typeface="Arial" panose="020B0604020202020204" pitchFamily="34" charset="0"/>
+              </a:rPr>
+              <a:t>    p.nombre AS paciente_nombre,</a:t>
+            </a:r>
+            <a:endParaRPr lang="es-AR" sz="1050" kern="1100" dirty="0">
+              <a:effectLst/>
+              <a:latin typeface="Arial" panose="020B0604020202020204" pitchFamily="34" charset="0"/>
+              <a:ea typeface="Arial" panose="020B0604020202020204" pitchFamily="34" charset="0"/>
+            </a:endParaRPr>
+          </a:p>
+          <a:p>
+            <a:pPr algn="just">
+              <a:lnSpc>
+                <a:spcPct val="115000"/>
+              </a:lnSpc>
+              <a:buNone/>
+            </a:pPr>
+            <a:r>
+              <a:rPr lang="es-AR" sz="800" kern="1100" dirty="0">
+                <a:solidFill>
+                  <a:srgbClr val="000000"/>
+                </a:solidFill>
+                <a:effectLst/>
+                <a:latin typeface="Lucida Console" panose="020B0609040504020204" pitchFamily="49" charset="0"/>
+                <a:ea typeface="Arial" panose="020B0604020202020204" pitchFamily="34" charset="0"/>
+              </a:rPr>
+              <a:t>    p.apellido AS paciente_apellido,</a:t>
+            </a:r>
+            <a:endParaRPr lang="es-AR" sz="1050" kern="1100" dirty="0">
+              <a:effectLst/>
+              <a:latin typeface="Arial" panose="020B0604020202020204" pitchFamily="34" charset="0"/>
+              <a:ea typeface="Arial" panose="020B0604020202020204" pitchFamily="34" charset="0"/>
+            </a:endParaRPr>
+          </a:p>
+          <a:p>
+            <a:pPr algn="just">
+              <a:lnSpc>
+                <a:spcPct val="115000"/>
+              </a:lnSpc>
+              <a:buNone/>
+            </a:pPr>
+            <a:r>
+              <a:rPr lang="es-AR" sz="800" kern="1100" dirty="0">
+                <a:solidFill>
+                  <a:srgbClr val="000000"/>
+                </a:solidFill>
+                <a:effectLst/>
+                <a:latin typeface="Lucida Console" panose="020B0609040504020204" pitchFamily="49" charset="0"/>
+                <a:ea typeface="Arial" panose="020B0604020202020204" pitchFamily="34" charset="0"/>
+              </a:rPr>
+              <a:t>    p.email AS paciente_email,</a:t>
+            </a:r>
+            <a:endParaRPr lang="es-AR" sz="1050" kern="1100" dirty="0">
+              <a:effectLst/>
+              <a:latin typeface="Arial" panose="020B0604020202020204" pitchFamily="34" charset="0"/>
+              <a:ea typeface="Arial" panose="020B0604020202020204" pitchFamily="34" charset="0"/>
+            </a:endParaRPr>
+          </a:p>
+          <a:p>
+            <a:pPr algn="just">
+              <a:lnSpc>
+                <a:spcPct val="115000"/>
+              </a:lnSpc>
+              <a:buNone/>
+            </a:pPr>
+            <a:r>
+              <a:rPr lang="es-AR" sz="800" kern="1100" dirty="0">
+                <a:solidFill>
+                  <a:srgbClr val="000000"/>
+                </a:solidFill>
+                <a:effectLst/>
+                <a:latin typeface="Lucida Console" panose="020B0609040504020204" pitchFamily="49" charset="0"/>
+                <a:ea typeface="Arial" panose="020B0604020202020204" pitchFamily="34" charset="0"/>
+              </a:rPr>
+              <a:t>    p.telefono AS paciente_telefono,</a:t>
+            </a:r>
+            <a:endParaRPr lang="es-AR" sz="1050" kern="1100" dirty="0">
+              <a:effectLst/>
+              <a:latin typeface="Arial" panose="020B0604020202020204" pitchFamily="34" charset="0"/>
+              <a:ea typeface="Arial" panose="020B0604020202020204" pitchFamily="34" charset="0"/>
+            </a:endParaRPr>
+          </a:p>
+          <a:p>
+            <a:pPr algn="just">
+              <a:lnSpc>
+                <a:spcPct val="115000"/>
+              </a:lnSpc>
+              <a:buNone/>
+            </a:pPr>
+            <a:r>
+              <a:rPr lang="es-AR" sz="800" kern="1100" dirty="0">
+                <a:solidFill>
+                  <a:srgbClr val="000000"/>
+                </a:solidFill>
+                <a:effectLst/>
+                <a:latin typeface="Lucida Console" panose="020B0609040504020204" pitchFamily="49" charset="0"/>
+                <a:ea typeface="Arial" panose="020B0604020202020204" pitchFamily="34" charset="0"/>
+              </a:rPr>
+              <a:t>    p.direccion AS paciente_direccion,</a:t>
+            </a:r>
+            <a:endParaRPr lang="es-AR" sz="1050" kern="1100" dirty="0">
+              <a:effectLst/>
+              <a:latin typeface="Arial" panose="020B0604020202020204" pitchFamily="34" charset="0"/>
+              <a:ea typeface="Arial" panose="020B0604020202020204" pitchFamily="34" charset="0"/>
+            </a:endParaRPr>
+          </a:p>
+          <a:p>
+            <a:pPr algn="just">
+              <a:lnSpc>
+                <a:spcPct val="115000"/>
+              </a:lnSpc>
+              <a:buNone/>
+            </a:pPr>
+            <a:r>
+              <a:rPr lang="es-AR" sz="800" kern="1100" dirty="0">
+                <a:solidFill>
+                  <a:srgbClr val="000000"/>
+                </a:solidFill>
+                <a:effectLst/>
+                <a:latin typeface="Lucida Console" panose="020B0609040504020204" pitchFamily="49" charset="0"/>
+                <a:ea typeface="Arial" panose="020B0604020202020204" pitchFamily="34" charset="0"/>
+              </a:rPr>
+              <a:t>    p.nro_afiliado,</a:t>
+            </a:r>
+            <a:endParaRPr lang="es-AR" sz="1050" kern="1100" dirty="0">
+              <a:effectLst/>
+              <a:latin typeface="Arial" panose="020B0604020202020204" pitchFamily="34" charset="0"/>
+              <a:ea typeface="Arial" panose="020B0604020202020204" pitchFamily="34" charset="0"/>
+            </a:endParaRPr>
+          </a:p>
+          <a:p>
+            <a:pPr algn="just">
+              <a:lnSpc>
+                <a:spcPct val="115000"/>
+              </a:lnSpc>
+              <a:buNone/>
+            </a:pPr>
+            <a:r>
+              <a:rPr lang="es-AR" sz="800" kern="1100" dirty="0">
+                <a:solidFill>
+                  <a:srgbClr val="000000"/>
+                </a:solidFill>
+                <a:effectLst/>
+                <a:latin typeface="Lucida Console" panose="020B0609040504020204" pitchFamily="49" charset="0"/>
+                <a:ea typeface="Arial" panose="020B0604020202020204" pitchFamily="34" charset="0"/>
+              </a:rPr>
+              <a:t>    p.id_obra_social,</a:t>
+            </a:r>
+            <a:endParaRPr lang="es-AR" sz="1050" kern="1100" dirty="0">
+              <a:effectLst/>
+              <a:latin typeface="Arial" panose="020B0604020202020204" pitchFamily="34" charset="0"/>
+              <a:ea typeface="Arial" panose="020B0604020202020204" pitchFamily="34" charset="0"/>
+            </a:endParaRPr>
+          </a:p>
+          <a:p>
+            <a:pPr algn="just">
+              <a:lnSpc>
+                <a:spcPct val="115000"/>
+              </a:lnSpc>
+              <a:buNone/>
+            </a:pPr>
+            <a:r>
+              <a:rPr lang="es-AR" sz="800" kern="1100" dirty="0">
+                <a:solidFill>
+                  <a:srgbClr val="000000"/>
+                </a:solidFill>
+                <a:effectLst/>
+                <a:latin typeface="Lucida Console" panose="020B0609040504020204" pitchFamily="49" charset="0"/>
+                <a:ea typeface="Arial" panose="020B0604020202020204" pitchFamily="34" charset="0"/>
+              </a:rPr>
+              <a:t>    m.id_medico,</a:t>
+            </a:r>
+            <a:endParaRPr lang="es-AR" sz="1050" kern="1100" dirty="0">
+              <a:effectLst/>
+              <a:latin typeface="Arial" panose="020B0604020202020204" pitchFamily="34" charset="0"/>
+              <a:ea typeface="Arial" panose="020B0604020202020204" pitchFamily="34" charset="0"/>
+            </a:endParaRPr>
+          </a:p>
+          <a:p>
+            <a:pPr algn="just">
+              <a:lnSpc>
+                <a:spcPct val="115000"/>
+              </a:lnSpc>
+              <a:buNone/>
+            </a:pPr>
+            <a:r>
+              <a:rPr lang="es-AR" sz="800" kern="1100" dirty="0">
+                <a:solidFill>
+                  <a:srgbClr val="000000"/>
+                </a:solidFill>
+                <a:effectLst/>
+                <a:latin typeface="Lucida Console" panose="020B0609040504020204" pitchFamily="49" charset="0"/>
+                <a:ea typeface="Arial" panose="020B0604020202020204" pitchFamily="34" charset="0"/>
+              </a:rPr>
+              <a:t>    m.nombre AS medico_nombre,</a:t>
+            </a:r>
+            <a:endParaRPr lang="es-AR" sz="1050" kern="1100" dirty="0">
+              <a:effectLst/>
+              <a:latin typeface="Arial" panose="020B0604020202020204" pitchFamily="34" charset="0"/>
+              <a:ea typeface="Arial" panose="020B0604020202020204" pitchFamily="34" charset="0"/>
+            </a:endParaRPr>
+          </a:p>
+          <a:p>
+            <a:pPr algn="just">
+              <a:lnSpc>
+                <a:spcPct val="115000"/>
+              </a:lnSpc>
+              <a:buNone/>
+            </a:pPr>
+            <a:r>
+              <a:rPr lang="es-AR" sz="800" kern="1100" dirty="0">
+                <a:solidFill>
+                  <a:srgbClr val="000000"/>
+                </a:solidFill>
+                <a:effectLst/>
+                <a:latin typeface="Lucida Console" panose="020B0609040504020204" pitchFamily="49" charset="0"/>
+                <a:ea typeface="Arial" panose="020B0604020202020204" pitchFamily="34" charset="0"/>
+              </a:rPr>
+              <a:t>    m.apellido AS medico_apellido,</a:t>
+            </a:r>
+            <a:endParaRPr lang="es-AR" sz="1050" kern="1100" dirty="0">
+              <a:effectLst/>
+              <a:latin typeface="Arial" panose="020B0604020202020204" pitchFamily="34" charset="0"/>
+              <a:ea typeface="Arial" panose="020B0604020202020204" pitchFamily="34" charset="0"/>
+            </a:endParaRPr>
+          </a:p>
+          <a:p>
+            <a:pPr algn="just">
+              <a:lnSpc>
+                <a:spcPct val="115000"/>
+              </a:lnSpc>
+              <a:buNone/>
+            </a:pPr>
+            <a:r>
+              <a:rPr lang="es-AR" sz="800" kern="1100" dirty="0">
+                <a:solidFill>
+                  <a:srgbClr val="000000"/>
+                </a:solidFill>
+                <a:effectLst/>
+                <a:latin typeface="Lucida Console" panose="020B0609040504020204" pitchFamily="49" charset="0"/>
+                <a:ea typeface="Arial" panose="020B0604020202020204" pitchFamily="34" charset="0"/>
+              </a:rPr>
+              <a:t>    m.matricula,</a:t>
+            </a:r>
+            <a:endParaRPr lang="es-AR" sz="1050" kern="1100" dirty="0">
+              <a:effectLst/>
+              <a:latin typeface="Arial" panose="020B0604020202020204" pitchFamily="34" charset="0"/>
+              <a:ea typeface="Arial" panose="020B0604020202020204" pitchFamily="34" charset="0"/>
+            </a:endParaRPr>
+          </a:p>
+          <a:p>
+            <a:pPr algn="just">
+              <a:lnSpc>
+                <a:spcPct val="115000"/>
+              </a:lnSpc>
+              <a:buNone/>
+            </a:pPr>
+            <a:r>
+              <a:rPr lang="es-AR" sz="800" kern="1100" dirty="0">
+                <a:solidFill>
+                  <a:srgbClr val="000000"/>
+                </a:solidFill>
+                <a:effectLst/>
+                <a:latin typeface="Lucida Console" panose="020B0609040504020204" pitchFamily="49" charset="0"/>
+                <a:ea typeface="Arial" panose="020B0604020202020204" pitchFamily="34" charset="0"/>
+              </a:rPr>
+              <a:t>    m.id_especialidad</a:t>
+            </a:r>
+            <a:endParaRPr lang="es-AR" sz="1050" kern="1100" dirty="0">
+              <a:effectLst/>
+              <a:latin typeface="Arial" panose="020B0604020202020204" pitchFamily="34" charset="0"/>
+              <a:ea typeface="Arial" panose="020B0604020202020204" pitchFamily="34" charset="0"/>
+            </a:endParaRPr>
+          </a:p>
+          <a:p>
+            <a:pPr algn="just">
+              <a:lnSpc>
+                <a:spcPct val="115000"/>
+              </a:lnSpc>
+              <a:buNone/>
+            </a:pPr>
+            <a:r>
+              <a:rPr lang="es-AR" sz="800" kern="1100" dirty="0">
+                <a:solidFill>
+                  <a:srgbClr val="000000"/>
+                </a:solidFill>
+                <a:effectLst/>
+                <a:latin typeface="Lucida Console" panose="020B0609040504020204" pitchFamily="49" charset="0"/>
+                <a:ea typeface="Arial" panose="020B0604020202020204" pitchFamily="34" charset="0"/>
+              </a:rPr>
+              <a:t>    </a:t>
+            </a:r>
+            <a:endParaRPr lang="es-AR" sz="1050" kern="1100" dirty="0">
+              <a:effectLst/>
+              <a:latin typeface="Arial" panose="020B0604020202020204" pitchFamily="34" charset="0"/>
+              <a:ea typeface="Arial" panose="020B0604020202020204" pitchFamily="34" charset="0"/>
+            </a:endParaRPr>
+          </a:p>
+          <a:p>
+            <a:pPr algn="just">
+              <a:lnSpc>
+                <a:spcPct val="115000"/>
+              </a:lnSpc>
+              <a:buNone/>
+            </a:pPr>
+            <a:r>
+              <a:rPr lang="es-AR" sz="800" kern="1100" dirty="0">
+                <a:solidFill>
+                  <a:srgbClr val="000000"/>
+                </a:solidFill>
+                <a:effectLst/>
+                <a:latin typeface="Lucida Console" panose="020B0609040504020204" pitchFamily="49" charset="0"/>
+                <a:ea typeface="Arial" panose="020B0604020202020204" pitchFamily="34" charset="0"/>
+              </a:rPr>
+              <a:t>FROM evoluciones_clinicas ec</a:t>
+            </a:r>
+            <a:endParaRPr lang="es-AR" sz="1050" kern="1100" dirty="0">
+              <a:effectLst/>
+              <a:latin typeface="Arial" panose="020B0604020202020204" pitchFamily="34" charset="0"/>
+              <a:ea typeface="Arial" panose="020B0604020202020204" pitchFamily="34" charset="0"/>
+            </a:endParaRPr>
+          </a:p>
+          <a:p>
+            <a:pPr algn="just">
+              <a:lnSpc>
+                <a:spcPct val="115000"/>
+              </a:lnSpc>
+              <a:buNone/>
+            </a:pPr>
+            <a:r>
+              <a:rPr lang="es-AR" sz="800" kern="1100" dirty="0">
+                <a:solidFill>
+                  <a:srgbClr val="000000"/>
+                </a:solidFill>
+                <a:effectLst/>
+                <a:latin typeface="Lucida Console" panose="020B0609040504020204" pitchFamily="49" charset="0"/>
+                <a:ea typeface="Arial" panose="020B0604020202020204" pitchFamily="34" charset="0"/>
+              </a:rPr>
+              <a:t>JOIN paciente p ON ec.id_paciente = p.id_paciente</a:t>
+            </a:r>
+            <a:endParaRPr lang="es-AR" sz="1050" kern="1100" dirty="0">
+              <a:effectLst/>
+              <a:latin typeface="Arial" panose="020B0604020202020204" pitchFamily="34" charset="0"/>
+              <a:ea typeface="Arial" panose="020B0604020202020204" pitchFamily="34" charset="0"/>
+            </a:endParaRPr>
+          </a:p>
+          <a:p>
+            <a:pPr algn="just">
+              <a:lnSpc>
+                <a:spcPct val="115000"/>
+              </a:lnSpc>
+              <a:buNone/>
+            </a:pPr>
+            <a:r>
+              <a:rPr lang="es-AR" sz="800" kern="1100" dirty="0">
+                <a:solidFill>
+                  <a:srgbClr val="000000"/>
+                </a:solidFill>
+                <a:effectLst/>
+                <a:latin typeface="Lucida Console" panose="020B0609040504020204" pitchFamily="49" charset="0"/>
+                <a:ea typeface="Arial" panose="020B0604020202020204" pitchFamily="34" charset="0"/>
+              </a:rPr>
+              <a:t>JOIN medico m ON ec.id_medico = m.id_medico;</a:t>
+            </a:r>
+            <a:endParaRPr lang="es-AR" sz="1050" kern="1100" dirty="0">
+              <a:effectLst/>
+              <a:latin typeface="Arial" panose="020B0604020202020204" pitchFamily="34" charset="0"/>
+              <a:ea typeface="Arial" panose="020B0604020202020204" pitchFamily="34" charset="0"/>
+            </a:endParaRPr>
+          </a:p>
+          <a:p>
+            <a:pPr algn="just">
+              <a:lnSpc>
+                <a:spcPct val="115000"/>
+              </a:lnSpc>
+            </a:pPr>
+            <a:r>
+              <a:rPr lang="es-ES" sz="800" kern="1100" dirty="0">
+                <a:effectLst/>
+                <a:latin typeface="Lucida Console" panose="020B0609040504020204" pitchFamily="49" charset="0"/>
+                <a:ea typeface="Arial" panose="020B0604020202020204" pitchFamily="34" charset="0"/>
+              </a:rPr>
+              <a:t> </a:t>
+            </a:r>
+            <a:endParaRPr lang="es-AR" sz="1050" kern="1100" dirty="0">
+              <a:effectLst/>
+              <a:latin typeface="Arial" panose="020B0604020202020204" pitchFamily="34" charset="0"/>
+              <a:ea typeface="Arial" panose="020B0604020202020204" pitchFamily="34" charset="0"/>
+            </a:endParaRPr>
+          </a:p>
+        </p:txBody>
+      </p:sp>
+      <p:sp>
+        <p:nvSpPr>
+          <p:cNvPr id="8" name="Cuadro de texto 2">
+            <a:extLst>
+              <a:ext uri="{FF2B5EF4-FFF2-40B4-BE49-F238E27FC236}">
+                <a16:creationId xmlns:a16="http://schemas.microsoft.com/office/drawing/2014/main" id="{F4194F85-7DD6-D385-3519-C477E5A54804}"/>
+              </a:ext>
+            </a:extLst>
+          </p:cNvPr>
+          <p:cNvSpPr txBox="1">
+            <a:spLocks noChangeArrowheads="1"/>
+          </p:cNvSpPr>
+          <p:nvPr/>
+        </p:nvSpPr>
+        <p:spPr bwMode="auto">
+          <a:xfrm>
+            <a:off x="6711579" y="1905000"/>
+            <a:ext cx="4237990" cy="3886000"/>
+          </a:xfrm>
+          <a:prstGeom prst="rect">
+            <a:avLst/>
+          </a:prstGeom>
+          <a:ln>
+            <a:headEnd/>
+            <a:tailEnd/>
+          </a:ln>
+        </p:spPr>
+        <p:style>
+          <a:lnRef idx="2">
+            <a:schemeClr val="accent1"/>
+          </a:lnRef>
+          <a:fillRef idx="1">
+            <a:schemeClr val="lt1"/>
+          </a:fillRef>
+          <a:effectRef idx="0">
+            <a:schemeClr val="accent1"/>
+          </a:effectRef>
+          <a:fontRef idx="minor">
+            <a:schemeClr val="dk1"/>
+          </a:fontRef>
+        </p:style>
+        <p:txBody>
+          <a:bodyPr rot="0" vert="horz" wrap="square" lIns="91440" tIns="45720" rIns="91440" bIns="45720" anchor="t" anchorCtr="0">
+            <a:spAutoFit/>
+          </a:bodyPr>
+          <a:lstStyle/>
+          <a:p>
+            <a:pPr algn="just">
+              <a:lnSpc>
+                <a:spcPct val="115000"/>
+              </a:lnSpc>
+              <a:buNone/>
+            </a:pPr>
+            <a:r>
+              <a:rPr lang="es-AR" sz="800" dirty="0">
+                <a:solidFill>
+                  <a:srgbClr val="000000"/>
+                </a:solidFill>
+                <a:effectLst/>
+                <a:latin typeface="Lucida Console" panose="020B0609040504020204" pitchFamily="49" charset="0"/>
+                <a:ea typeface="Arial" panose="020B0604020202020204" pitchFamily="34" charset="0"/>
+              </a:rPr>
+              <a:t>CREATE VIEW vista_turnos_medicos AS</a:t>
+            </a:r>
+            <a:endParaRPr lang="es-AR" sz="1050" dirty="0">
+              <a:effectLst/>
+              <a:latin typeface="Arial" panose="020B0604020202020204" pitchFamily="34" charset="0"/>
+              <a:ea typeface="Arial" panose="020B0604020202020204" pitchFamily="34" charset="0"/>
+            </a:endParaRPr>
+          </a:p>
+          <a:p>
+            <a:pPr algn="just">
+              <a:lnSpc>
+                <a:spcPct val="115000"/>
+              </a:lnSpc>
+              <a:buNone/>
+            </a:pPr>
+            <a:r>
+              <a:rPr lang="es-AR" sz="800" dirty="0">
+                <a:solidFill>
+                  <a:srgbClr val="000000"/>
+                </a:solidFill>
+                <a:effectLst/>
+                <a:latin typeface="Lucida Console" panose="020B0609040504020204" pitchFamily="49" charset="0"/>
+                <a:ea typeface="Arial" panose="020B0604020202020204" pitchFamily="34" charset="0"/>
+              </a:rPr>
+              <a:t>SELECT</a:t>
+            </a:r>
+            <a:endParaRPr lang="es-AR" sz="1050" dirty="0">
+              <a:effectLst/>
+              <a:latin typeface="Arial" panose="020B0604020202020204" pitchFamily="34" charset="0"/>
+              <a:ea typeface="Arial" panose="020B0604020202020204" pitchFamily="34" charset="0"/>
+            </a:endParaRPr>
+          </a:p>
+          <a:p>
+            <a:pPr algn="just">
+              <a:lnSpc>
+                <a:spcPct val="115000"/>
+              </a:lnSpc>
+              <a:buNone/>
+            </a:pPr>
+            <a:r>
+              <a:rPr lang="es-AR" sz="800" dirty="0">
+                <a:solidFill>
+                  <a:srgbClr val="000000"/>
+                </a:solidFill>
+                <a:effectLst/>
+                <a:latin typeface="Lucida Console" panose="020B0609040504020204" pitchFamily="49" charset="0"/>
+                <a:ea typeface="Arial" panose="020B0604020202020204" pitchFamily="34" charset="0"/>
+              </a:rPr>
+              <a:t>    t.id_turno,</a:t>
+            </a:r>
+            <a:endParaRPr lang="es-AR" sz="1050" dirty="0">
+              <a:effectLst/>
+              <a:latin typeface="Arial" panose="020B0604020202020204" pitchFamily="34" charset="0"/>
+              <a:ea typeface="Arial" panose="020B0604020202020204" pitchFamily="34" charset="0"/>
+            </a:endParaRPr>
+          </a:p>
+          <a:p>
+            <a:pPr algn="just">
+              <a:lnSpc>
+                <a:spcPct val="115000"/>
+              </a:lnSpc>
+              <a:buNone/>
+            </a:pPr>
+            <a:r>
+              <a:rPr lang="es-AR" sz="800" dirty="0">
+                <a:solidFill>
+                  <a:srgbClr val="000000"/>
+                </a:solidFill>
+                <a:effectLst/>
+                <a:latin typeface="Lucida Console" panose="020B0609040504020204" pitchFamily="49" charset="0"/>
+                <a:ea typeface="Arial" panose="020B0604020202020204" pitchFamily="34" charset="0"/>
+              </a:rPr>
+              <a:t>    t.fecha,</a:t>
+            </a:r>
+            <a:endParaRPr lang="es-AR" sz="1050" dirty="0">
+              <a:effectLst/>
+              <a:latin typeface="Arial" panose="020B0604020202020204" pitchFamily="34" charset="0"/>
+              <a:ea typeface="Arial" panose="020B0604020202020204" pitchFamily="34" charset="0"/>
+            </a:endParaRPr>
+          </a:p>
+          <a:p>
+            <a:pPr algn="just">
+              <a:lnSpc>
+                <a:spcPct val="115000"/>
+              </a:lnSpc>
+              <a:buNone/>
+            </a:pPr>
+            <a:r>
+              <a:rPr lang="es-AR" sz="800" dirty="0">
+                <a:solidFill>
+                  <a:srgbClr val="000000"/>
+                </a:solidFill>
+                <a:effectLst/>
+                <a:latin typeface="Lucida Console" panose="020B0609040504020204" pitchFamily="49" charset="0"/>
+                <a:ea typeface="Arial" panose="020B0604020202020204" pitchFamily="34" charset="0"/>
+              </a:rPr>
+              <a:t>    t.hora,</a:t>
+            </a:r>
+            <a:endParaRPr lang="es-AR" sz="1050" dirty="0">
+              <a:effectLst/>
+              <a:latin typeface="Arial" panose="020B0604020202020204" pitchFamily="34" charset="0"/>
+              <a:ea typeface="Arial" panose="020B0604020202020204" pitchFamily="34" charset="0"/>
+            </a:endParaRPr>
+          </a:p>
+          <a:p>
+            <a:pPr algn="just">
+              <a:lnSpc>
+                <a:spcPct val="115000"/>
+              </a:lnSpc>
+              <a:buNone/>
+            </a:pPr>
+            <a:r>
+              <a:rPr lang="es-AR" sz="800" dirty="0">
+                <a:solidFill>
+                  <a:srgbClr val="000000"/>
+                </a:solidFill>
+                <a:effectLst/>
+                <a:latin typeface="Lucida Console" panose="020B0609040504020204" pitchFamily="49" charset="0"/>
+                <a:ea typeface="Arial" panose="020B0604020202020204" pitchFamily="34" charset="0"/>
+              </a:rPr>
+              <a:t>    t.motivo,</a:t>
+            </a:r>
+            <a:endParaRPr lang="es-AR" sz="1050" dirty="0">
+              <a:effectLst/>
+              <a:latin typeface="Arial" panose="020B0604020202020204" pitchFamily="34" charset="0"/>
+              <a:ea typeface="Arial" panose="020B0604020202020204" pitchFamily="34" charset="0"/>
+            </a:endParaRPr>
+          </a:p>
+          <a:p>
+            <a:pPr algn="just">
+              <a:lnSpc>
+                <a:spcPct val="115000"/>
+              </a:lnSpc>
+              <a:buNone/>
+            </a:pPr>
+            <a:r>
+              <a:rPr lang="es-AR" sz="800" dirty="0">
+                <a:solidFill>
+                  <a:srgbClr val="000000"/>
+                </a:solidFill>
+                <a:effectLst/>
+                <a:latin typeface="Lucida Console" panose="020B0609040504020204" pitchFamily="49" charset="0"/>
+                <a:ea typeface="Arial" panose="020B0604020202020204" pitchFamily="34" charset="0"/>
+              </a:rPr>
+              <a:t>    t.observaciones,</a:t>
+            </a:r>
+            <a:endParaRPr lang="es-AR" sz="1050" dirty="0">
+              <a:effectLst/>
+              <a:latin typeface="Arial" panose="020B0604020202020204" pitchFamily="34" charset="0"/>
+              <a:ea typeface="Arial" panose="020B0604020202020204" pitchFamily="34" charset="0"/>
+            </a:endParaRPr>
+          </a:p>
+          <a:p>
+            <a:pPr algn="just">
+              <a:lnSpc>
+                <a:spcPct val="115000"/>
+              </a:lnSpc>
+              <a:buNone/>
+            </a:pPr>
+            <a:r>
+              <a:rPr lang="es-AR" sz="800" dirty="0">
+                <a:solidFill>
+                  <a:srgbClr val="000000"/>
+                </a:solidFill>
+                <a:effectLst/>
+                <a:latin typeface="Lucida Console" panose="020B0609040504020204" pitchFamily="49" charset="0"/>
+                <a:ea typeface="Arial" panose="020B0604020202020204" pitchFamily="34" charset="0"/>
+              </a:rPr>
+              <a:t>    p.id_paciente,</a:t>
+            </a:r>
+            <a:endParaRPr lang="es-AR" sz="1050" dirty="0">
+              <a:effectLst/>
+              <a:latin typeface="Arial" panose="020B0604020202020204" pitchFamily="34" charset="0"/>
+              <a:ea typeface="Arial" panose="020B0604020202020204" pitchFamily="34" charset="0"/>
+            </a:endParaRPr>
+          </a:p>
+          <a:p>
+            <a:pPr algn="just">
+              <a:lnSpc>
+                <a:spcPct val="115000"/>
+              </a:lnSpc>
+              <a:buNone/>
+            </a:pPr>
+            <a:r>
+              <a:rPr lang="es-AR" sz="800" dirty="0">
+                <a:solidFill>
+                  <a:srgbClr val="000000"/>
+                </a:solidFill>
+                <a:effectLst/>
+                <a:latin typeface="Lucida Console" panose="020B0609040504020204" pitchFamily="49" charset="0"/>
+                <a:ea typeface="Arial" panose="020B0604020202020204" pitchFamily="34" charset="0"/>
+              </a:rPr>
+              <a:t>    p.dni,</a:t>
+            </a:r>
+            <a:endParaRPr lang="es-AR" sz="1050" dirty="0">
+              <a:effectLst/>
+              <a:latin typeface="Arial" panose="020B0604020202020204" pitchFamily="34" charset="0"/>
+              <a:ea typeface="Arial" panose="020B0604020202020204" pitchFamily="34" charset="0"/>
+            </a:endParaRPr>
+          </a:p>
+          <a:p>
+            <a:pPr algn="just">
+              <a:lnSpc>
+                <a:spcPct val="115000"/>
+              </a:lnSpc>
+              <a:buNone/>
+            </a:pPr>
+            <a:r>
+              <a:rPr lang="es-AR" sz="800" dirty="0">
+                <a:solidFill>
+                  <a:srgbClr val="000000"/>
+                </a:solidFill>
+                <a:effectLst/>
+                <a:latin typeface="Lucida Console" panose="020B0609040504020204" pitchFamily="49" charset="0"/>
+                <a:ea typeface="Arial" panose="020B0604020202020204" pitchFamily="34" charset="0"/>
+              </a:rPr>
+              <a:t>    p.nombre AS paciente_nombre,</a:t>
+            </a:r>
+            <a:endParaRPr lang="es-AR" sz="1050" dirty="0">
+              <a:effectLst/>
+              <a:latin typeface="Arial" panose="020B0604020202020204" pitchFamily="34" charset="0"/>
+              <a:ea typeface="Arial" panose="020B0604020202020204" pitchFamily="34" charset="0"/>
+            </a:endParaRPr>
+          </a:p>
+          <a:p>
+            <a:pPr algn="just">
+              <a:lnSpc>
+                <a:spcPct val="115000"/>
+              </a:lnSpc>
+              <a:buNone/>
+            </a:pPr>
+            <a:r>
+              <a:rPr lang="es-AR" sz="800" dirty="0">
+                <a:solidFill>
+                  <a:srgbClr val="000000"/>
+                </a:solidFill>
+                <a:effectLst/>
+                <a:latin typeface="Lucida Console" panose="020B0609040504020204" pitchFamily="49" charset="0"/>
+                <a:ea typeface="Arial" panose="020B0604020202020204" pitchFamily="34" charset="0"/>
+              </a:rPr>
+              <a:t>    p.apellido AS paciente_apellido,</a:t>
+            </a:r>
+            <a:endParaRPr lang="es-AR" sz="1050" dirty="0">
+              <a:effectLst/>
+              <a:latin typeface="Arial" panose="020B0604020202020204" pitchFamily="34" charset="0"/>
+              <a:ea typeface="Arial" panose="020B0604020202020204" pitchFamily="34" charset="0"/>
+            </a:endParaRPr>
+          </a:p>
+          <a:p>
+            <a:pPr algn="just">
+              <a:lnSpc>
+                <a:spcPct val="115000"/>
+              </a:lnSpc>
+              <a:buNone/>
+            </a:pPr>
+            <a:r>
+              <a:rPr lang="es-AR" sz="800" dirty="0">
+                <a:solidFill>
+                  <a:srgbClr val="000000"/>
+                </a:solidFill>
+                <a:effectLst/>
+                <a:latin typeface="Lucida Console" panose="020B0609040504020204" pitchFamily="49" charset="0"/>
+                <a:ea typeface="Arial" panose="020B0604020202020204" pitchFamily="34" charset="0"/>
+              </a:rPr>
+              <a:t>    p.email AS paciente_email,</a:t>
+            </a:r>
+            <a:endParaRPr lang="es-AR" sz="1050" dirty="0">
+              <a:effectLst/>
+              <a:latin typeface="Arial" panose="020B0604020202020204" pitchFamily="34" charset="0"/>
+              <a:ea typeface="Arial" panose="020B0604020202020204" pitchFamily="34" charset="0"/>
+            </a:endParaRPr>
+          </a:p>
+          <a:p>
+            <a:pPr algn="just">
+              <a:lnSpc>
+                <a:spcPct val="115000"/>
+              </a:lnSpc>
+              <a:buNone/>
+            </a:pPr>
+            <a:r>
+              <a:rPr lang="es-AR" sz="800" dirty="0">
+                <a:solidFill>
+                  <a:srgbClr val="000000"/>
+                </a:solidFill>
+                <a:effectLst/>
+                <a:latin typeface="Lucida Console" panose="020B0609040504020204" pitchFamily="49" charset="0"/>
+                <a:ea typeface="Arial" panose="020B0604020202020204" pitchFamily="34" charset="0"/>
+              </a:rPr>
+              <a:t>    p.telefono AS paciente_telefono,</a:t>
+            </a:r>
+            <a:endParaRPr lang="es-AR" sz="1050" dirty="0">
+              <a:effectLst/>
+              <a:latin typeface="Arial" panose="020B0604020202020204" pitchFamily="34" charset="0"/>
+              <a:ea typeface="Arial" panose="020B0604020202020204" pitchFamily="34" charset="0"/>
+            </a:endParaRPr>
+          </a:p>
+          <a:p>
+            <a:pPr algn="just">
+              <a:lnSpc>
+                <a:spcPct val="115000"/>
+              </a:lnSpc>
+              <a:buNone/>
+            </a:pPr>
+            <a:r>
+              <a:rPr lang="es-AR" sz="800" dirty="0">
+                <a:solidFill>
+                  <a:srgbClr val="000000"/>
+                </a:solidFill>
+                <a:effectLst/>
+                <a:latin typeface="Lucida Console" panose="020B0609040504020204" pitchFamily="49" charset="0"/>
+                <a:ea typeface="Arial" panose="020B0604020202020204" pitchFamily="34" charset="0"/>
+              </a:rPr>
+              <a:t>    p.direccion AS paciente_direccion,</a:t>
+            </a:r>
+            <a:endParaRPr lang="es-AR" sz="1050" dirty="0">
+              <a:effectLst/>
+              <a:latin typeface="Arial" panose="020B0604020202020204" pitchFamily="34" charset="0"/>
+              <a:ea typeface="Arial" panose="020B0604020202020204" pitchFamily="34" charset="0"/>
+            </a:endParaRPr>
+          </a:p>
+          <a:p>
+            <a:pPr algn="just">
+              <a:lnSpc>
+                <a:spcPct val="115000"/>
+              </a:lnSpc>
+              <a:buNone/>
+            </a:pPr>
+            <a:r>
+              <a:rPr lang="es-AR" sz="800" dirty="0">
+                <a:solidFill>
+                  <a:srgbClr val="000000"/>
+                </a:solidFill>
+                <a:effectLst/>
+                <a:latin typeface="Lucida Console" panose="020B0609040504020204" pitchFamily="49" charset="0"/>
+                <a:ea typeface="Arial" panose="020B0604020202020204" pitchFamily="34" charset="0"/>
+              </a:rPr>
+              <a:t>    p.nro_afiliado,</a:t>
+            </a:r>
+            <a:endParaRPr lang="es-AR" sz="1050" dirty="0">
+              <a:effectLst/>
+              <a:latin typeface="Arial" panose="020B0604020202020204" pitchFamily="34" charset="0"/>
+              <a:ea typeface="Arial" panose="020B0604020202020204" pitchFamily="34" charset="0"/>
+            </a:endParaRPr>
+          </a:p>
+          <a:p>
+            <a:pPr algn="just">
+              <a:lnSpc>
+                <a:spcPct val="115000"/>
+              </a:lnSpc>
+              <a:buNone/>
+            </a:pPr>
+            <a:r>
+              <a:rPr lang="es-AR" sz="800" dirty="0">
+                <a:solidFill>
+                  <a:srgbClr val="000000"/>
+                </a:solidFill>
+                <a:effectLst/>
+                <a:latin typeface="Lucida Console" panose="020B0609040504020204" pitchFamily="49" charset="0"/>
+                <a:ea typeface="Arial" panose="020B0604020202020204" pitchFamily="34" charset="0"/>
+              </a:rPr>
+              <a:t>    p.id_obra_social,</a:t>
+            </a:r>
+            <a:endParaRPr lang="es-AR" sz="1050" dirty="0">
+              <a:effectLst/>
+              <a:latin typeface="Arial" panose="020B0604020202020204" pitchFamily="34" charset="0"/>
+              <a:ea typeface="Arial" panose="020B0604020202020204" pitchFamily="34" charset="0"/>
+            </a:endParaRPr>
+          </a:p>
+          <a:p>
+            <a:pPr algn="just">
+              <a:lnSpc>
+                <a:spcPct val="115000"/>
+              </a:lnSpc>
+              <a:buNone/>
+            </a:pPr>
+            <a:r>
+              <a:rPr lang="es-AR" sz="800" dirty="0">
+                <a:solidFill>
+                  <a:srgbClr val="000000"/>
+                </a:solidFill>
+                <a:effectLst/>
+                <a:latin typeface="Lucida Console" panose="020B0609040504020204" pitchFamily="49" charset="0"/>
+                <a:ea typeface="Arial" panose="020B0604020202020204" pitchFamily="34" charset="0"/>
+              </a:rPr>
+              <a:t>    m.id_medico,</a:t>
+            </a:r>
+            <a:endParaRPr lang="es-AR" sz="1050" dirty="0">
+              <a:effectLst/>
+              <a:latin typeface="Arial" panose="020B0604020202020204" pitchFamily="34" charset="0"/>
+              <a:ea typeface="Arial" panose="020B0604020202020204" pitchFamily="34" charset="0"/>
+            </a:endParaRPr>
+          </a:p>
+          <a:p>
+            <a:pPr algn="just">
+              <a:lnSpc>
+                <a:spcPct val="115000"/>
+              </a:lnSpc>
+              <a:buNone/>
+            </a:pPr>
+            <a:r>
+              <a:rPr lang="es-AR" sz="800" dirty="0">
+                <a:solidFill>
+                  <a:srgbClr val="000000"/>
+                </a:solidFill>
+                <a:effectLst/>
+                <a:latin typeface="Lucida Console" panose="020B0609040504020204" pitchFamily="49" charset="0"/>
+                <a:ea typeface="Arial" panose="020B0604020202020204" pitchFamily="34" charset="0"/>
+              </a:rPr>
+              <a:t>    m.nombre AS medico_nombre,</a:t>
+            </a:r>
+            <a:endParaRPr lang="es-AR" sz="1050" dirty="0">
+              <a:effectLst/>
+              <a:latin typeface="Arial" panose="020B0604020202020204" pitchFamily="34" charset="0"/>
+              <a:ea typeface="Arial" panose="020B0604020202020204" pitchFamily="34" charset="0"/>
+            </a:endParaRPr>
+          </a:p>
+          <a:p>
+            <a:pPr algn="just">
+              <a:lnSpc>
+                <a:spcPct val="115000"/>
+              </a:lnSpc>
+              <a:buNone/>
+            </a:pPr>
+            <a:r>
+              <a:rPr lang="es-AR" sz="800" dirty="0">
+                <a:solidFill>
+                  <a:srgbClr val="000000"/>
+                </a:solidFill>
+                <a:effectLst/>
+                <a:latin typeface="Lucida Console" panose="020B0609040504020204" pitchFamily="49" charset="0"/>
+                <a:ea typeface="Arial" panose="020B0604020202020204" pitchFamily="34" charset="0"/>
+              </a:rPr>
+              <a:t>    m.apellido AS medico_apellido,</a:t>
+            </a:r>
+            <a:endParaRPr lang="es-AR" sz="1050" dirty="0">
+              <a:effectLst/>
+              <a:latin typeface="Arial" panose="020B0604020202020204" pitchFamily="34" charset="0"/>
+              <a:ea typeface="Arial" panose="020B0604020202020204" pitchFamily="34" charset="0"/>
+            </a:endParaRPr>
+          </a:p>
+          <a:p>
+            <a:pPr algn="just">
+              <a:lnSpc>
+                <a:spcPct val="115000"/>
+              </a:lnSpc>
+              <a:buNone/>
+            </a:pPr>
+            <a:r>
+              <a:rPr lang="es-AR" sz="800" dirty="0">
+                <a:solidFill>
+                  <a:srgbClr val="000000"/>
+                </a:solidFill>
+                <a:effectLst/>
+                <a:latin typeface="Lucida Console" panose="020B0609040504020204" pitchFamily="49" charset="0"/>
+                <a:ea typeface="Arial" panose="020B0604020202020204" pitchFamily="34" charset="0"/>
+              </a:rPr>
+              <a:t>    m.matricula,</a:t>
+            </a:r>
+            <a:endParaRPr lang="es-AR" sz="1050" dirty="0">
+              <a:effectLst/>
+              <a:latin typeface="Arial" panose="020B0604020202020204" pitchFamily="34" charset="0"/>
+              <a:ea typeface="Arial" panose="020B0604020202020204" pitchFamily="34" charset="0"/>
+            </a:endParaRPr>
+          </a:p>
+          <a:p>
+            <a:pPr algn="just">
+              <a:lnSpc>
+                <a:spcPct val="115000"/>
+              </a:lnSpc>
+              <a:buNone/>
+            </a:pPr>
+            <a:r>
+              <a:rPr lang="es-AR" sz="800" dirty="0">
+                <a:solidFill>
+                  <a:srgbClr val="000000"/>
+                </a:solidFill>
+                <a:effectLst/>
+                <a:latin typeface="Lucida Console" panose="020B0609040504020204" pitchFamily="49" charset="0"/>
+                <a:ea typeface="Arial" panose="020B0604020202020204" pitchFamily="34" charset="0"/>
+              </a:rPr>
+              <a:t>    m.id_especialidad</a:t>
+            </a:r>
+            <a:endParaRPr lang="es-AR" sz="1050" dirty="0">
+              <a:effectLst/>
+              <a:latin typeface="Arial" panose="020B0604020202020204" pitchFamily="34" charset="0"/>
+              <a:ea typeface="Arial" panose="020B0604020202020204" pitchFamily="34" charset="0"/>
+            </a:endParaRPr>
+          </a:p>
+          <a:p>
+            <a:pPr algn="just">
+              <a:lnSpc>
+                <a:spcPct val="115000"/>
+              </a:lnSpc>
+              <a:buNone/>
+            </a:pPr>
+            <a:r>
+              <a:rPr lang="es-AR" sz="800" dirty="0">
+                <a:solidFill>
+                  <a:srgbClr val="000000"/>
+                </a:solidFill>
+                <a:effectLst/>
+                <a:latin typeface="Lucida Console" panose="020B0609040504020204" pitchFamily="49" charset="0"/>
+                <a:ea typeface="Arial" panose="020B0604020202020204" pitchFamily="34" charset="0"/>
+              </a:rPr>
+              <a:t>    </a:t>
+            </a:r>
+            <a:endParaRPr lang="es-AR" sz="1050" dirty="0">
+              <a:effectLst/>
+              <a:latin typeface="Arial" panose="020B0604020202020204" pitchFamily="34" charset="0"/>
+              <a:ea typeface="Arial" panose="020B0604020202020204" pitchFamily="34" charset="0"/>
+            </a:endParaRPr>
+          </a:p>
+          <a:p>
+            <a:pPr algn="just">
+              <a:lnSpc>
+                <a:spcPct val="115000"/>
+              </a:lnSpc>
+              <a:buNone/>
+            </a:pPr>
+            <a:r>
+              <a:rPr lang="es-AR" sz="800" dirty="0">
+                <a:solidFill>
+                  <a:srgbClr val="000000"/>
+                </a:solidFill>
+                <a:effectLst/>
+                <a:latin typeface="Lucida Console" panose="020B0609040504020204" pitchFamily="49" charset="0"/>
+                <a:ea typeface="Arial" panose="020B0604020202020204" pitchFamily="34" charset="0"/>
+              </a:rPr>
+              <a:t>FROM turno t</a:t>
+            </a:r>
+            <a:endParaRPr lang="es-AR" sz="1050" dirty="0">
+              <a:effectLst/>
+              <a:latin typeface="Arial" panose="020B0604020202020204" pitchFamily="34" charset="0"/>
+              <a:ea typeface="Arial" panose="020B0604020202020204" pitchFamily="34" charset="0"/>
+            </a:endParaRPr>
+          </a:p>
+          <a:p>
+            <a:pPr algn="just">
+              <a:lnSpc>
+                <a:spcPct val="115000"/>
+              </a:lnSpc>
+              <a:buNone/>
+            </a:pPr>
+            <a:r>
+              <a:rPr lang="es-AR" sz="800" dirty="0">
+                <a:solidFill>
+                  <a:srgbClr val="000000"/>
+                </a:solidFill>
+                <a:effectLst/>
+                <a:latin typeface="Lucida Console" panose="020B0609040504020204" pitchFamily="49" charset="0"/>
+                <a:ea typeface="Arial" panose="020B0604020202020204" pitchFamily="34" charset="0"/>
+              </a:rPr>
+              <a:t>JOIN paciente p ON t.id_paciente = p.id_paciente</a:t>
+            </a:r>
+            <a:endParaRPr lang="es-AR" sz="1050" dirty="0">
+              <a:effectLst/>
+              <a:latin typeface="Arial" panose="020B0604020202020204" pitchFamily="34" charset="0"/>
+              <a:ea typeface="Arial" panose="020B0604020202020204" pitchFamily="34" charset="0"/>
+            </a:endParaRPr>
+          </a:p>
+          <a:p>
+            <a:pPr algn="just">
+              <a:lnSpc>
+                <a:spcPct val="115000"/>
+              </a:lnSpc>
+              <a:buNone/>
+            </a:pPr>
+            <a:r>
+              <a:rPr lang="es-AR" sz="800" dirty="0">
+                <a:solidFill>
+                  <a:srgbClr val="000000"/>
+                </a:solidFill>
+                <a:effectLst/>
+                <a:latin typeface="Lucida Console" panose="020B0609040504020204" pitchFamily="49" charset="0"/>
+                <a:ea typeface="Arial" panose="020B0604020202020204" pitchFamily="34" charset="0"/>
+              </a:rPr>
+              <a:t>JOIN medico m ON t.id_medico = m.id_medico;</a:t>
+            </a:r>
+            <a:endParaRPr lang="es-AR" sz="1050" dirty="0">
+              <a:effectLst/>
+              <a:latin typeface="Arial" panose="020B0604020202020204" pitchFamily="34" charset="0"/>
+              <a:ea typeface="Arial" panose="020B0604020202020204" pitchFamily="34" charset="0"/>
+            </a:endParaRPr>
+          </a:p>
+          <a:p>
+            <a:pPr algn="just">
+              <a:lnSpc>
+                <a:spcPct val="115000"/>
+              </a:lnSpc>
+            </a:pPr>
+            <a:r>
+              <a:rPr lang="es-ES" sz="800" dirty="0">
+                <a:effectLst/>
+                <a:latin typeface="Lucida Console" panose="020B0609040504020204" pitchFamily="49" charset="0"/>
+                <a:ea typeface="Arial" panose="020B0604020202020204" pitchFamily="34" charset="0"/>
+              </a:rPr>
+              <a:t> </a:t>
+            </a:r>
+            <a:endParaRPr lang="es-AR" sz="1100" dirty="0">
+              <a:effectLst/>
+              <a:latin typeface="Arial" panose="020B0604020202020204" pitchFamily="34" charset="0"/>
+              <a:ea typeface="Arial" panose="020B0604020202020204" pitchFamily="34" charset="0"/>
+            </a:endParaRPr>
+          </a:p>
+        </p:txBody>
+      </p:sp>
     </p:spTree>
     <p:extLst>
       <p:ext uri="{BB962C8B-B14F-4D97-AF65-F5344CB8AC3E}">
@@ -9681,70 +11264,949 @@
             <a:pPr algn="ctr"/>
             <a:r>
               <a:rPr lang="es-ES" dirty="0"/>
-              <a:t>Vista para secretario.</a:t>
+              <a:t>Vista evoluciones y turnos para  secretarios.</a:t>
             </a:r>
           </a:p>
         </p:txBody>
       </p:sp>
-      <p:pic>
-        <p:nvPicPr>
-          <p:cNvPr id="5" name="Marcador de contenido 4">
+      <p:sp>
+        <p:nvSpPr>
+          <p:cNvPr id="7" name="Cuadro de texto 2">
             <a:extLst>
               <a:ext uri="{FF2B5EF4-FFF2-40B4-BE49-F238E27FC236}">
-                <a16:creationId xmlns:a16="http://schemas.microsoft.com/office/drawing/2014/main" id="{56978481-4397-49B2-B3D9-E7F7EF3B35F8}"/>
+                <a16:creationId xmlns:a16="http://schemas.microsoft.com/office/drawing/2014/main" id="{3D965868-7C65-6661-FB5E-9544384D92EA}"/>
               </a:ext>
             </a:extLst>
           </p:cNvPr>
-          <p:cNvPicPr>
-            <a:picLocks noGrp="1" noChangeAspect="1"/>
-          </p:cNvPicPr>
-          <p:nvPr>
-            <p:ph idx="1"/>
-          </p:nvPr>
-        </p:nvPicPr>
-        <p:blipFill>
-          <a:blip r:embed="rId2"/>
-          <a:stretch>
-            <a:fillRect/>
-          </a:stretch>
-        </p:blipFill>
-        <p:spPr>
+          <p:cNvSpPr txBox="1">
+            <a:spLocks noChangeArrowheads="1"/>
+          </p:cNvSpPr>
+          <p:nvPr/>
+        </p:nvSpPr>
+        <p:spPr bwMode="auto">
           <a:xfrm>
-            <a:off x="4692184" y="1905000"/>
-            <a:ext cx="4451815" cy="3099054"/>
-          </a:xfrm>
-        </p:spPr>
-      </p:pic>
-      <p:pic>
-        <p:nvPicPr>
-          <p:cNvPr id="4" name="Imagen 3">
-            <a:extLst>
-              <a:ext uri="{FF2B5EF4-FFF2-40B4-BE49-F238E27FC236}">
-                <a16:creationId xmlns:a16="http://schemas.microsoft.com/office/drawing/2014/main" id="{A10687BC-4EF0-4BE5-B491-6CAFD89D260E}"/>
-              </a:ext>
-            </a:extLst>
-          </p:cNvPr>
-          <p:cNvPicPr>
-            <a:picLocks noChangeAspect="1"/>
-          </p:cNvPicPr>
-          <p:nvPr/>
-        </p:nvPicPr>
-        <p:blipFill>
-          <a:blip r:embed="rId3"/>
-          <a:stretch>
-            <a:fillRect/>
-          </a:stretch>
-        </p:blipFill>
-        <p:spPr>
-          <a:xfrm>
-            <a:off x="4635818" y="5377069"/>
-            <a:ext cx="4564545" cy="646307"/>
+            <a:off x="1794522" y="2008066"/>
+            <a:ext cx="4237990" cy="2841868"/>
           </a:xfrm>
           <a:prstGeom prst="rect">
             <a:avLst/>
           </a:prstGeom>
+          <a:solidFill>
+            <a:srgbClr val="FFFFFF"/>
+          </a:solidFill>
+          <a:ln w="9525">
+            <a:solidFill>
+              <a:srgbClr val="000000"/>
+            </a:solidFill>
+            <a:miter lim="800000"/>
+            <a:headEnd/>
+            <a:tailEnd/>
+          </a:ln>
         </p:spPr>
-      </p:pic>
+        <p:txBody>
+          <a:bodyPr rot="0" vert="horz" wrap="square" lIns="91440" tIns="45720" rIns="91440" bIns="45720" anchor="t" anchorCtr="0">
+            <a:spAutoFit/>
+          </a:bodyPr>
+          <a:lstStyle/>
+          <a:p>
+            <a:pPr algn="just">
+              <a:lnSpc>
+                <a:spcPct val="115000"/>
+              </a:lnSpc>
+              <a:buNone/>
+            </a:pPr>
+            <a:r>
+              <a:rPr lang="es-AR" sz="800" dirty="0">
+                <a:solidFill>
+                  <a:srgbClr val="000000"/>
+                </a:solidFill>
+                <a:effectLst/>
+                <a:latin typeface="Lucida Console" panose="020B0609040504020204" pitchFamily="49" charset="0"/>
+                <a:ea typeface="Arial" panose="020B0604020202020204" pitchFamily="34" charset="0"/>
+              </a:rPr>
+              <a:t>CREATE OR REPLACE VIEW vista_turnos_secretarios AS</a:t>
+            </a:r>
+            <a:endParaRPr lang="es-AR" sz="1050" dirty="0">
+              <a:effectLst/>
+              <a:latin typeface="Arial" panose="020B0604020202020204" pitchFamily="34" charset="0"/>
+              <a:ea typeface="Arial" panose="020B0604020202020204" pitchFamily="34" charset="0"/>
+            </a:endParaRPr>
+          </a:p>
+          <a:p>
+            <a:pPr algn="just">
+              <a:lnSpc>
+                <a:spcPct val="115000"/>
+              </a:lnSpc>
+              <a:buNone/>
+            </a:pPr>
+            <a:r>
+              <a:rPr lang="es-AR" sz="800" dirty="0">
+                <a:solidFill>
+                  <a:srgbClr val="000000"/>
+                </a:solidFill>
+                <a:effectLst/>
+                <a:latin typeface="Lucida Console" panose="020B0609040504020204" pitchFamily="49" charset="0"/>
+                <a:ea typeface="Arial" panose="020B0604020202020204" pitchFamily="34" charset="0"/>
+              </a:rPr>
+              <a:t>SELECT</a:t>
+            </a:r>
+            <a:endParaRPr lang="es-AR" sz="1050" dirty="0">
+              <a:effectLst/>
+              <a:latin typeface="Arial" panose="020B0604020202020204" pitchFamily="34" charset="0"/>
+              <a:ea typeface="Arial" panose="020B0604020202020204" pitchFamily="34" charset="0"/>
+            </a:endParaRPr>
+          </a:p>
+          <a:p>
+            <a:pPr algn="just">
+              <a:lnSpc>
+                <a:spcPct val="115000"/>
+              </a:lnSpc>
+              <a:buNone/>
+            </a:pPr>
+            <a:r>
+              <a:rPr lang="es-AR" sz="800" dirty="0">
+                <a:solidFill>
+                  <a:srgbClr val="000000"/>
+                </a:solidFill>
+                <a:effectLst/>
+                <a:latin typeface="Lucida Console" panose="020B0609040504020204" pitchFamily="49" charset="0"/>
+                <a:ea typeface="Arial" panose="020B0604020202020204" pitchFamily="34" charset="0"/>
+              </a:rPr>
+              <a:t>    t.id_turno,</a:t>
+            </a:r>
+            <a:endParaRPr lang="es-AR" sz="1050" dirty="0">
+              <a:effectLst/>
+              <a:latin typeface="Arial" panose="020B0604020202020204" pitchFamily="34" charset="0"/>
+              <a:ea typeface="Arial" panose="020B0604020202020204" pitchFamily="34" charset="0"/>
+            </a:endParaRPr>
+          </a:p>
+          <a:p>
+            <a:pPr algn="just">
+              <a:lnSpc>
+                <a:spcPct val="115000"/>
+              </a:lnSpc>
+              <a:buNone/>
+            </a:pPr>
+            <a:r>
+              <a:rPr lang="es-AR" sz="800" dirty="0">
+                <a:solidFill>
+                  <a:srgbClr val="000000"/>
+                </a:solidFill>
+                <a:effectLst/>
+                <a:latin typeface="Lucida Console" panose="020B0609040504020204" pitchFamily="49" charset="0"/>
+                <a:ea typeface="Arial" panose="020B0604020202020204" pitchFamily="34" charset="0"/>
+              </a:rPr>
+              <a:t>    t.fecha_id,</a:t>
+            </a:r>
+            <a:endParaRPr lang="es-AR" sz="1050" dirty="0">
+              <a:effectLst/>
+              <a:latin typeface="Arial" panose="020B0604020202020204" pitchFamily="34" charset="0"/>
+              <a:ea typeface="Arial" panose="020B0604020202020204" pitchFamily="34" charset="0"/>
+            </a:endParaRPr>
+          </a:p>
+          <a:p>
+            <a:pPr algn="just">
+              <a:lnSpc>
+                <a:spcPct val="115000"/>
+              </a:lnSpc>
+              <a:buNone/>
+            </a:pPr>
+            <a:r>
+              <a:rPr lang="es-AR" sz="800" dirty="0">
+                <a:solidFill>
+                  <a:srgbClr val="000000"/>
+                </a:solidFill>
+                <a:effectLst/>
+                <a:latin typeface="Lucida Console" panose="020B0609040504020204" pitchFamily="49" charset="0"/>
+                <a:ea typeface="Arial" panose="020B0604020202020204" pitchFamily="34" charset="0"/>
+              </a:rPr>
+              <a:t>    t.hora,</a:t>
+            </a:r>
+            <a:endParaRPr lang="es-AR" sz="1050" dirty="0">
+              <a:effectLst/>
+              <a:latin typeface="Arial" panose="020B0604020202020204" pitchFamily="34" charset="0"/>
+              <a:ea typeface="Arial" panose="020B0604020202020204" pitchFamily="34" charset="0"/>
+            </a:endParaRPr>
+          </a:p>
+          <a:p>
+            <a:pPr algn="just">
+              <a:lnSpc>
+                <a:spcPct val="115000"/>
+              </a:lnSpc>
+              <a:buNone/>
+            </a:pPr>
+            <a:r>
+              <a:rPr lang="es-AR" sz="800" dirty="0">
+                <a:solidFill>
+                  <a:srgbClr val="000000"/>
+                </a:solidFill>
+                <a:effectLst/>
+                <a:latin typeface="Lucida Console" panose="020B0609040504020204" pitchFamily="49" charset="0"/>
+                <a:ea typeface="Arial" panose="020B0604020202020204" pitchFamily="34" charset="0"/>
+              </a:rPr>
+              <a:t>    p.id_paciente,</a:t>
+            </a:r>
+            <a:endParaRPr lang="es-AR" sz="1050" dirty="0">
+              <a:effectLst/>
+              <a:latin typeface="Arial" panose="020B0604020202020204" pitchFamily="34" charset="0"/>
+              <a:ea typeface="Arial" panose="020B0604020202020204" pitchFamily="34" charset="0"/>
+            </a:endParaRPr>
+          </a:p>
+          <a:p>
+            <a:pPr algn="just">
+              <a:lnSpc>
+                <a:spcPct val="115000"/>
+              </a:lnSpc>
+              <a:buNone/>
+            </a:pPr>
+            <a:r>
+              <a:rPr lang="es-AR" sz="800" dirty="0">
+                <a:solidFill>
+                  <a:srgbClr val="000000"/>
+                </a:solidFill>
+                <a:effectLst/>
+                <a:latin typeface="Lucida Console" panose="020B0609040504020204" pitchFamily="49" charset="0"/>
+                <a:ea typeface="Arial" panose="020B0604020202020204" pitchFamily="34" charset="0"/>
+              </a:rPr>
+              <a:t>    p.dni,</a:t>
+            </a:r>
+            <a:endParaRPr lang="es-AR" sz="1050" dirty="0">
+              <a:effectLst/>
+              <a:latin typeface="Arial" panose="020B0604020202020204" pitchFamily="34" charset="0"/>
+              <a:ea typeface="Arial" panose="020B0604020202020204" pitchFamily="34" charset="0"/>
+            </a:endParaRPr>
+          </a:p>
+          <a:p>
+            <a:pPr algn="just">
+              <a:lnSpc>
+                <a:spcPct val="115000"/>
+              </a:lnSpc>
+              <a:buNone/>
+            </a:pPr>
+            <a:r>
+              <a:rPr lang="es-AR" sz="800" dirty="0">
+                <a:solidFill>
+                  <a:srgbClr val="000000"/>
+                </a:solidFill>
+                <a:effectLst/>
+                <a:latin typeface="Lucida Console" panose="020B0609040504020204" pitchFamily="49" charset="0"/>
+                <a:ea typeface="Arial" panose="020B0604020202020204" pitchFamily="34" charset="0"/>
+              </a:rPr>
+              <a:t>    p.nombre AS paciente_nombre,</a:t>
+            </a:r>
+            <a:endParaRPr lang="es-AR" sz="1050" dirty="0">
+              <a:effectLst/>
+              <a:latin typeface="Arial" panose="020B0604020202020204" pitchFamily="34" charset="0"/>
+              <a:ea typeface="Arial" panose="020B0604020202020204" pitchFamily="34" charset="0"/>
+            </a:endParaRPr>
+          </a:p>
+          <a:p>
+            <a:pPr algn="just">
+              <a:lnSpc>
+                <a:spcPct val="115000"/>
+              </a:lnSpc>
+              <a:buNone/>
+            </a:pPr>
+            <a:r>
+              <a:rPr lang="es-AR" sz="800" dirty="0">
+                <a:solidFill>
+                  <a:srgbClr val="000000"/>
+                </a:solidFill>
+                <a:effectLst/>
+                <a:latin typeface="Lucida Console" panose="020B0609040504020204" pitchFamily="49" charset="0"/>
+                <a:ea typeface="Arial" panose="020B0604020202020204" pitchFamily="34" charset="0"/>
+              </a:rPr>
+              <a:t>    p.apellido AS paciente_apellido,</a:t>
+            </a:r>
+            <a:endParaRPr lang="es-AR" sz="1050" dirty="0">
+              <a:effectLst/>
+              <a:latin typeface="Arial" panose="020B0604020202020204" pitchFamily="34" charset="0"/>
+              <a:ea typeface="Arial" panose="020B0604020202020204" pitchFamily="34" charset="0"/>
+            </a:endParaRPr>
+          </a:p>
+          <a:p>
+            <a:pPr algn="just">
+              <a:lnSpc>
+                <a:spcPct val="115000"/>
+              </a:lnSpc>
+              <a:buNone/>
+            </a:pPr>
+            <a:r>
+              <a:rPr lang="es-AR" sz="800" dirty="0">
+                <a:solidFill>
+                  <a:srgbClr val="000000"/>
+                </a:solidFill>
+                <a:effectLst/>
+                <a:latin typeface="Lucida Console" panose="020B0609040504020204" pitchFamily="49" charset="0"/>
+                <a:ea typeface="Arial" panose="020B0604020202020204" pitchFamily="34" charset="0"/>
+              </a:rPr>
+              <a:t>    p.nro_afiliado,</a:t>
+            </a:r>
+            <a:endParaRPr lang="es-AR" sz="1050" dirty="0">
+              <a:effectLst/>
+              <a:latin typeface="Arial" panose="020B0604020202020204" pitchFamily="34" charset="0"/>
+              <a:ea typeface="Arial" panose="020B0604020202020204" pitchFamily="34" charset="0"/>
+            </a:endParaRPr>
+          </a:p>
+          <a:p>
+            <a:pPr algn="just">
+              <a:lnSpc>
+                <a:spcPct val="115000"/>
+              </a:lnSpc>
+              <a:buNone/>
+            </a:pPr>
+            <a:r>
+              <a:rPr lang="es-AR" sz="800" dirty="0">
+                <a:solidFill>
+                  <a:srgbClr val="000000"/>
+                </a:solidFill>
+                <a:effectLst/>
+                <a:latin typeface="Lucida Console" panose="020B0609040504020204" pitchFamily="49" charset="0"/>
+                <a:ea typeface="Arial" panose="020B0604020202020204" pitchFamily="34" charset="0"/>
+              </a:rPr>
+              <a:t>    m.id_medico,</a:t>
+            </a:r>
+            <a:endParaRPr lang="es-AR" sz="1050" dirty="0">
+              <a:effectLst/>
+              <a:latin typeface="Arial" panose="020B0604020202020204" pitchFamily="34" charset="0"/>
+              <a:ea typeface="Arial" panose="020B0604020202020204" pitchFamily="34" charset="0"/>
+            </a:endParaRPr>
+          </a:p>
+          <a:p>
+            <a:pPr algn="just">
+              <a:lnSpc>
+                <a:spcPct val="115000"/>
+              </a:lnSpc>
+              <a:buNone/>
+            </a:pPr>
+            <a:r>
+              <a:rPr lang="es-AR" sz="800" dirty="0">
+                <a:solidFill>
+                  <a:srgbClr val="000000"/>
+                </a:solidFill>
+                <a:effectLst/>
+                <a:latin typeface="Lucida Console" panose="020B0609040504020204" pitchFamily="49" charset="0"/>
+                <a:ea typeface="Arial" panose="020B0604020202020204" pitchFamily="34" charset="0"/>
+              </a:rPr>
+              <a:t>    m.nombre AS medico_nombre,</a:t>
+            </a:r>
+            <a:endParaRPr lang="es-AR" sz="1050" dirty="0">
+              <a:effectLst/>
+              <a:latin typeface="Arial" panose="020B0604020202020204" pitchFamily="34" charset="0"/>
+              <a:ea typeface="Arial" panose="020B0604020202020204" pitchFamily="34" charset="0"/>
+            </a:endParaRPr>
+          </a:p>
+          <a:p>
+            <a:pPr algn="just">
+              <a:lnSpc>
+                <a:spcPct val="115000"/>
+              </a:lnSpc>
+              <a:buNone/>
+            </a:pPr>
+            <a:r>
+              <a:rPr lang="es-AR" sz="800" dirty="0">
+                <a:solidFill>
+                  <a:srgbClr val="000000"/>
+                </a:solidFill>
+                <a:effectLst/>
+                <a:latin typeface="Lucida Console" panose="020B0609040504020204" pitchFamily="49" charset="0"/>
+                <a:ea typeface="Arial" panose="020B0604020202020204" pitchFamily="34" charset="0"/>
+              </a:rPr>
+              <a:t>    m.apellido AS medico_apellido,</a:t>
+            </a:r>
+            <a:endParaRPr lang="es-AR" sz="1050" dirty="0">
+              <a:effectLst/>
+              <a:latin typeface="Arial" panose="020B0604020202020204" pitchFamily="34" charset="0"/>
+              <a:ea typeface="Arial" panose="020B0604020202020204" pitchFamily="34" charset="0"/>
+            </a:endParaRPr>
+          </a:p>
+          <a:p>
+            <a:pPr algn="just">
+              <a:lnSpc>
+                <a:spcPct val="115000"/>
+              </a:lnSpc>
+              <a:buNone/>
+            </a:pPr>
+            <a:r>
+              <a:rPr lang="es-AR" sz="800" dirty="0">
+                <a:solidFill>
+                  <a:srgbClr val="000000"/>
+                </a:solidFill>
+                <a:effectLst/>
+                <a:latin typeface="Lucida Console" panose="020B0609040504020204" pitchFamily="49" charset="0"/>
+                <a:ea typeface="Arial" panose="020B0604020202020204" pitchFamily="34" charset="0"/>
+              </a:rPr>
+              <a:t>    m.id_especialidad</a:t>
+            </a:r>
+            <a:endParaRPr lang="es-AR" sz="1050" dirty="0">
+              <a:effectLst/>
+              <a:latin typeface="Arial" panose="020B0604020202020204" pitchFamily="34" charset="0"/>
+              <a:ea typeface="Arial" panose="020B0604020202020204" pitchFamily="34" charset="0"/>
+            </a:endParaRPr>
+          </a:p>
+          <a:p>
+            <a:pPr algn="just">
+              <a:lnSpc>
+                <a:spcPct val="115000"/>
+              </a:lnSpc>
+              <a:buNone/>
+            </a:pPr>
+            <a:r>
+              <a:rPr lang="es-AR" sz="800" dirty="0">
+                <a:solidFill>
+                  <a:srgbClr val="000000"/>
+                </a:solidFill>
+                <a:effectLst/>
+                <a:latin typeface="Lucida Console" panose="020B0609040504020204" pitchFamily="49" charset="0"/>
+                <a:ea typeface="Arial" panose="020B0604020202020204" pitchFamily="34" charset="0"/>
+              </a:rPr>
+              <a:t>    </a:t>
+            </a:r>
+            <a:endParaRPr lang="es-AR" sz="1050" dirty="0">
+              <a:effectLst/>
+              <a:latin typeface="Arial" panose="020B0604020202020204" pitchFamily="34" charset="0"/>
+              <a:ea typeface="Arial" panose="020B0604020202020204" pitchFamily="34" charset="0"/>
+            </a:endParaRPr>
+          </a:p>
+          <a:p>
+            <a:pPr algn="just">
+              <a:lnSpc>
+                <a:spcPct val="115000"/>
+              </a:lnSpc>
+              <a:buNone/>
+            </a:pPr>
+            <a:r>
+              <a:rPr lang="es-AR" sz="800" dirty="0">
+                <a:solidFill>
+                  <a:srgbClr val="000000"/>
+                </a:solidFill>
+                <a:effectLst/>
+                <a:latin typeface="Lucida Console" panose="020B0609040504020204" pitchFamily="49" charset="0"/>
+                <a:ea typeface="Arial" panose="020B0604020202020204" pitchFamily="34" charset="0"/>
+              </a:rPr>
+              <a:t>FROM turno t</a:t>
+            </a:r>
+            <a:endParaRPr lang="es-AR" sz="1050" dirty="0">
+              <a:effectLst/>
+              <a:latin typeface="Arial" panose="020B0604020202020204" pitchFamily="34" charset="0"/>
+              <a:ea typeface="Arial" panose="020B0604020202020204" pitchFamily="34" charset="0"/>
+            </a:endParaRPr>
+          </a:p>
+          <a:p>
+            <a:pPr algn="just">
+              <a:lnSpc>
+                <a:spcPct val="115000"/>
+              </a:lnSpc>
+              <a:buNone/>
+            </a:pPr>
+            <a:r>
+              <a:rPr lang="es-AR" sz="800" dirty="0">
+                <a:solidFill>
+                  <a:srgbClr val="000000"/>
+                </a:solidFill>
+                <a:effectLst/>
+                <a:latin typeface="Lucida Console" panose="020B0609040504020204" pitchFamily="49" charset="0"/>
+                <a:ea typeface="Arial" panose="020B0604020202020204" pitchFamily="34" charset="0"/>
+              </a:rPr>
+              <a:t>JOIN paciente p ON t.id_paciente = p.id_paciente</a:t>
+            </a:r>
+            <a:endParaRPr lang="es-AR" sz="1050" dirty="0">
+              <a:effectLst/>
+              <a:latin typeface="Arial" panose="020B0604020202020204" pitchFamily="34" charset="0"/>
+              <a:ea typeface="Arial" panose="020B0604020202020204" pitchFamily="34" charset="0"/>
+            </a:endParaRPr>
+          </a:p>
+          <a:p>
+            <a:pPr algn="just">
+              <a:lnSpc>
+                <a:spcPct val="115000"/>
+              </a:lnSpc>
+              <a:buNone/>
+            </a:pPr>
+            <a:r>
+              <a:rPr lang="es-AR" sz="800" dirty="0">
+                <a:solidFill>
+                  <a:srgbClr val="000000"/>
+                </a:solidFill>
+                <a:effectLst/>
+                <a:latin typeface="Lucida Console" panose="020B0609040504020204" pitchFamily="49" charset="0"/>
+                <a:ea typeface="Arial" panose="020B0604020202020204" pitchFamily="34" charset="0"/>
+              </a:rPr>
+              <a:t>JOIN medico m ON t.id_medico = m.id_medico;</a:t>
+            </a:r>
+            <a:endParaRPr lang="es-AR" sz="1050" dirty="0">
+              <a:effectLst/>
+              <a:latin typeface="Arial" panose="020B0604020202020204" pitchFamily="34" charset="0"/>
+              <a:ea typeface="Arial" panose="020B0604020202020204" pitchFamily="34" charset="0"/>
+            </a:endParaRPr>
+          </a:p>
+          <a:p>
+            <a:pPr algn="just">
+              <a:lnSpc>
+                <a:spcPct val="115000"/>
+              </a:lnSpc>
+            </a:pPr>
+            <a:r>
+              <a:rPr lang="es-ES" sz="800" dirty="0">
+                <a:effectLst/>
+                <a:latin typeface="Lucida Console" panose="020B0609040504020204" pitchFamily="49" charset="0"/>
+                <a:ea typeface="Arial" panose="020B0604020202020204" pitchFamily="34" charset="0"/>
+              </a:rPr>
+              <a:t> </a:t>
+            </a:r>
+            <a:endParaRPr lang="es-AR" sz="1100" dirty="0">
+              <a:effectLst/>
+              <a:latin typeface="Arial" panose="020B0604020202020204" pitchFamily="34" charset="0"/>
+              <a:ea typeface="Arial" panose="020B0604020202020204" pitchFamily="34" charset="0"/>
+            </a:endParaRPr>
+          </a:p>
+        </p:txBody>
+      </p:sp>
+      <p:sp>
+        <p:nvSpPr>
+          <p:cNvPr id="8" name="Cuadro de texto 2">
+            <a:extLst>
+              <a:ext uri="{FF2B5EF4-FFF2-40B4-BE49-F238E27FC236}">
+                <a16:creationId xmlns:a16="http://schemas.microsoft.com/office/drawing/2014/main" id="{FA5780B6-B2A1-E484-468B-F3187C828423}"/>
+              </a:ext>
+            </a:extLst>
+          </p:cNvPr>
+          <p:cNvSpPr txBox="1">
+            <a:spLocks noChangeArrowheads="1"/>
+          </p:cNvSpPr>
+          <p:nvPr/>
+        </p:nvSpPr>
+        <p:spPr bwMode="auto">
+          <a:xfrm>
+            <a:off x="6677073" y="2008066"/>
+            <a:ext cx="4237990" cy="2541017"/>
+          </a:xfrm>
+          <a:prstGeom prst="rect">
+            <a:avLst/>
+          </a:prstGeom>
+          <a:solidFill>
+            <a:srgbClr val="FFFFFF"/>
+          </a:solidFill>
+          <a:ln w="9525">
+            <a:solidFill>
+              <a:srgbClr val="000000"/>
+            </a:solidFill>
+            <a:miter lim="800000"/>
+            <a:headEnd/>
+            <a:tailEnd/>
+          </a:ln>
+        </p:spPr>
+        <p:txBody>
+          <a:bodyPr rot="0" vert="horz" wrap="square" lIns="91440" tIns="45720" rIns="91440" bIns="45720" anchor="t" anchorCtr="0">
+            <a:spAutoFit/>
+          </a:bodyPr>
+          <a:lstStyle/>
+          <a:p>
+            <a:pPr algn="just">
+              <a:lnSpc>
+                <a:spcPct val="115000"/>
+              </a:lnSpc>
+              <a:buNone/>
+            </a:pPr>
+            <a:r>
+              <a:rPr lang="es-AR" sz="800" dirty="0">
+                <a:solidFill>
+                  <a:srgbClr val="000000"/>
+                </a:solidFill>
+                <a:effectLst/>
+                <a:latin typeface="Lucida Console" panose="020B0609040504020204" pitchFamily="49" charset="0"/>
+                <a:ea typeface="Arial" panose="020B0604020202020204" pitchFamily="34" charset="0"/>
+              </a:rPr>
+              <a:t>CREATE VIEW vista_evoluciones_secretarios AS</a:t>
+            </a:r>
+            <a:endParaRPr lang="es-AR" sz="1050" dirty="0">
+              <a:effectLst/>
+              <a:latin typeface="Arial" panose="020B0604020202020204" pitchFamily="34" charset="0"/>
+              <a:ea typeface="Arial" panose="020B0604020202020204" pitchFamily="34" charset="0"/>
+            </a:endParaRPr>
+          </a:p>
+          <a:p>
+            <a:pPr algn="just">
+              <a:lnSpc>
+                <a:spcPct val="115000"/>
+              </a:lnSpc>
+              <a:buNone/>
+            </a:pPr>
+            <a:r>
+              <a:rPr lang="es-AR" sz="800" dirty="0">
+                <a:solidFill>
+                  <a:srgbClr val="000000"/>
+                </a:solidFill>
+                <a:effectLst/>
+                <a:latin typeface="Lucida Console" panose="020B0609040504020204" pitchFamily="49" charset="0"/>
+                <a:ea typeface="Arial" panose="020B0604020202020204" pitchFamily="34" charset="0"/>
+              </a:rPr>
+              <a:t>SELECT</a:t>
+            </a:r>
+            <a:endParaRPr lang="es-AR" sz="1050" dirty="0">
+              <a:effectLst/>
+              <a:latin typeface="Arial" panose="020B0604020202020204" pitchFamily="34" charset="0"/>
+              <a:ea typeface="Arial" panose="020B0604020202020204" pitchFamily="34" charset="0"/>
+            </a:endParaRPr>
+          </a:p>
+          <a:p>
+            <a:pPr algn="just">
+              <a:lnSpc>
+                <a:spcPct val="115000"/>
+              </a:lnSpc>
+              <a:buNone/>
+            </a:pPr>
+            <a:r>
+              <a:rPr lang="es-AR" sz="800" dirty="0">
+                <a:solidFill>
+                  <a:srgbClr val="000000"/>
+                </a:solidFill>
+                <a:effectLst/>
+                <a:latin typeface="Lucida Console" panose="020B0609040504020204" pitchFamily="49" charset="0"/>
+                <a:ea typeface="Arial" panose="020B0604020202020204" pitchFamily="34" charset="0"/>
+              </a:rPr>
+              <a:t>    ec.id_evolucion,</a:t>
+            </a:r>
+            <a:endParaRPr lang="es-AR" sz="1050" dirty="0">
+              <a:effectLst/>
+              <a:latin typeface="Arial" panose="020B0604020202020204" pitchFamily="34" charset="0"/>
+              <a:ea typeface="Arial" panose="020B0604020202020204" pitchFamily="34" charset="0"/>
+            </a:endParaRPr>
+          </a:p>
+          <a:p>
+            <a:pPr algn="just">
+              <a:lnSpc>
+                <a:spcPct val="115000"/>
+              </a:lnSpc>
+              <a:buNone/>
+            </a:pPr>
+            <a:r>
+              <a:rPr lang="es-AR" sz="800" dirty="0">
+                <a:solidFill>
+                  <a:srgbClr val="000000"/>
+                </a:solidFill>
+                <a:effectLst/>
+                <a:latin typeface="Lucida Console" panose="020B0609040504020204" pitchFamily="49" charset="0"/>
+                <a:ea typeface="Arial" panose="020B0604020202020204" pitchFamily="34" charset="0"/>
+              </a:rPr>
+              <a:t>    ec.fecha_evolucion,</a:t>
+            </a:r>
+            <a:endParaRPr lang="es-AR" sz="1050" dirty="0">
+              <a:effectLst/>
+              <a:latin typeface="Arial" panose="020B0604020202020204" pitchFamily="34" charset="0"/>
+              <a:ea typeface="Arial" panose="020B0604020202020204" pitchFamily="34" charset="0"/>
+            </a:endParaRPr>
+          </a:p>
+          <a:p>
+            <a:pPr algn="just">
+              <a:lnSpc>
+                <a:spcPct val="115000"/>
+              </a:lnSpc>
+              <a:buNone/>
+            </a:pPr>
+            <a:r>
+              <a:rPr lang="es-AR" sz="800" dirty="0">
+                <a:solidFill>
+                  <a:srgbClr val="000000"/>
+                </a:solidFill>
+                <a:effectLst/>
+                <a:latin typeface="Lucida Console" panose="020B0609040504020204" pitchFamily="49" charset="0"/>
+                <a:ea typeface="Arial" panose="020B0604020202020204" pitchFamily="34" charset="0"/>
+              </a:rPr>
+              <a:t>    ec.tipo_evolucion,</a:t>
+            </a:r>
+            <a:endParaRPr lang="es-AR" sz="1050" dirty="0">
+              <a:effectLst/>
+              <a:latin typeface="Arial" panose="020B0604020202020204" pitchFamily="34" charset="0"/>
+              <a:ea typeface="Arial" panose="020B0604020202020204" pitchFamily="34" charset="0"/>
+            </a:endParaRPr>
+          </a:p>
+          <a:p>
+            <a:pPr algn="just">
+              <a:lnSpc>
+                <a:spcPct val="115000"/>
+              </a:lnSpc>
+              <a:buNone/>
+            </a:pPr>
+            <a:r>
+              <a:rPr lang="es-AR" sz="800" dirty="0">
+                <a:solidFill>
+                  <a:srgbClr val="000000"/>
+                </a:solidFill>
+                <a:effectLst/>
+                <a:latin typeface="Lucida Console" panose="020B0609040504020204" pitchFamily="49" charset="0"/>
+                <a:ea typeface="Arial" panose="020B0604020202020204" pitchFamily="34" charset="0"/>
+              </a:rPr>
+              <a:t>    p.id_paciente,</a:t>
+            </a:r>
+            <a:endParaRPr lang="es-AR" sz="1050" dirty="0">
+              <a:effectLst/>
+              <a:latin typeface="Arial" panose="020B0604020202020204" pitchFamily="34" charset="0"/>
+              <a:ea typeface="Arial" panose="020B0604020202020204" pitchFamily="34" charset="0"/>
+            </a:endParaRPr>
+          </a:p>
+          <a:p>
+            <a:pPr algn="just">
+              <a:lnSpc>
+                <a:spcPct val="115000"/>
+              </a:lnSpc>
+              <a:buNone/>
+            </a:pPr>
+            <a:r>
+              <a:rPr lang="es-AR" sz="800" dirty="0">
+                <a:solidFill>
+                  <a:srgbClr val="000000"/>
+                </a:solidFill>
+                <a:effectLst/>
+                <a:latin typeface="Lucida Console" panose="020B0609040504020204" pitchFamily="49" charset="0"/>
+                <a:ea typeface="Arial" panose="020B0604020202020204" pitchFamily="34" charset="0"/>
+              </a:rPr>
+              <a:t>    p.dni,</a:t>
+            </a:r>
+            <a:endParaRPr lang="es-AR" sz="1050" dirty="0">
+              <a:effectLst/>
+              <a:latin typeface="Arial" panose="020B0604020202020204" pitchFamily="34" charset="0"/>
+              <a:ea typeface="Arial" panose="020B0604020202020204" pitchFamily="34" charset="0"/>
+            </a:endParaRPr>
+          </a:p>
+          <a:p>
+            <a:pPr algn="just">
+              <a:lnSpc>
+                <a:spcPct val="115000"/>
+              </a:lnSpc>
+              <a:buNone/>
+            </a:pPr>
+            <a:r>
+              <a:rPr lang="es-AR" sz="800" dirty="0">
+                <a:solidFill>
+                  <a:srgbClr val="000000"/>
+                </a:solidFill>
+                <a:effectLst/>
+                <a:latin typeface="Lucida Console" panose="020B0609040504020204" pitchFamily="49" charset="0"/>
+                <a:ea typeface="Arial" panose="020B0604020202020204" pitchFamily="34" charset="0"/>
+              </a:rPr>
+              <a:t>    p.nombre AS paciente_nombre,</a:t>
+            </a:r>
+            <a:endParaRPr lang="es-AR" sz="1050" dirty="0">
+              <a:effectLst/>
+              <a:latin typeface="Arial" panose="020B0604020202020204" pitchFamily="34" charset="0"/>
+              <a:ea typeface="Arial" panose="020B0604020202020204" pitchFamily="34" charset="0"/>
+            </a:endParaRPr>
+          </a:p>
+          <a:p>
+            <a:pPr algn="just">
+              <a:lnSpc>
+                <a:spcPct val="115000"/>
+              </a:lnSpc>
+              <a:buNone/>
+            </a:pPr>
+            <a:r>
+              <a:rPr lang="es-AR" sz="800" dirty="0">
+                <a:solidFill>
+                  <a:srgbClr val="000000"/>
+                </a:solidFill>
+                <a:effectLst/>
+                <a:latin typeface="Lucida Console" panose="020B0609040504020204" pitchFamily="49" charset="0"/>
+                <a:ea typeface="Arial" panose="020B0604020202020204" pitchFamily="34" charset="0"/>
+              </a:rPr>
+              <a:t>    p.apellido AS paciente_apellido,</a:t>
+            </a:r>
+            <a:endParaRPr lang="es-AR" sz="1050" dirty="0">
+              <a:effectLst/>
+              <a:latin typeface="Arial" panose="020B0604020202020204" pitchFamily="34" charset="0"/>
+              <a:ea typeface="Arial" panose="020B0604020202020204" pitchFamily="34" charset="0"/>
+            </a:endParaRPr>
+          </a:p>
+          <a:p>
+            <a:pPr algn="just">
+              <a:lnSpc>
+                <a:spcPct val="115000"/>
+              </a:lnSpc>
+              <a:buNone/>
+            </a:pPr>
+            <a:r>
+              <a:rPr lang="es-AR" sz="800" dirty="0">
+                <a:solidFill>
+                  <a:srgbClr val="000000"/>
+                </a:solidFill>
+                <a:effectLst/>
+                <a:latin typeface="Lucida Console" panose="020B0609040504020204" pitchFamily="49" charset="0"/>
+                <a:ea typeface="Arial" panose="020B0604020202020204" pitchFamily="34" charset="0"/>
+              </a:rPr>
+              <a:t>    m.id_medico,</a:t>
+            </a:r>
+            <a:endParaRPr lang="es-AR" sz="1050" dirty="0">
+              <a:effectLst/>
+              <a:latin typeface="Arial" panose="020B0604020202020204" pitchFamily="34" charset="0"/>
+              <a:ea typeface="Arial" panose="020B0604020202020204" pitchFamily="34" charset="0"/>
+            </a:endParaRPr>
+          </a:p>
+          <a:p>
+            <a:pPr algn="just">
+              <a:lnSpc>
+                <a:spcPct val="115000"/>
+              </a:lnSpc>
+              <a:buNone/>
+            </a:pPr>
+            <a:r>
+              <a:rPr lang="es-AR" sz="800" dirty="0">
+                <a:solidFill>
+                  <a:srgbClr val="000000"/>
+                </a:solidFill>
+                <a:effectLst/>
+                <a:latin typeface="Lucida Console" panose="020B0609040504020204" pitchFamily="49" charset="0"/>
+                <a:ea typeface="Arial" panose="020B0604020202020204" pitchFamily="34" charset="0"/>
+              </a:rPr>
+              <a:t>    m.nombre AS medico_nombre,</a:t>
+            </a:r>
+            <a:endParaRPr lang="es-AR" sz="1050" dirty="0">
+              <a:effectLst/>
+              <a:latin typeface="Arial" panose="020B0604020202020204" pitchFamily="34" charset="0"/>
+              <a:ea typeface="Arial" panose="020B0604020202020204" pitchFamily="34" charset="0"/>
+            </a:endParaRPr>
+          </a:p>
+          <a:p>
+            <a:pPr algn="just">
+              <a:lnSpc>
+                <a:spcPct val="115000"/>
+              </a:lnSpc>
+              <a:buNone/>
+            </a:pPr>
+            <a:r>
+              <a:rPr lang="es-AR" sz="800" dirty="0">
+                <a:solidFill>
+                  <a:srgbClr val="000000"/>
+                </a:solidFill>
+                <a:effectLst/>
+                <a:latin typeface="Lucida Console" panose="020B0609040504020204" pitchFamily="49" charset="0"/>
+                <a:ea typeface="Arial" panose="020B0604020202020204" pitchFamily="34" charset="0"/>
+              </a:rPr>
+              <a:t>    m.apellido AS medico_apellido</a:t>
+            </a:r>
+            <a:endParaRPr lang="es-AR" sz="1050" dirty="0">
+              <a:effectLst/>
+              <a:latin typeface="Arial" panose="020B0604020202020204" pitchFamily="34" charset="0"/>
+              <a:ea typeface="Arial" panose="020B0604020202020204" pitchFamily="34" charset="0"/>
+            </a:endParaRPr>
+          </a:p>
+          <a:p>
+            <a:pPr algn="just">
+              <a:lnSpc>
+                <a:spcPct val="115000"/>
+              </a:lnSpc>
+              <a:buNone/>
+            </a:pPr>
+            <a:r>
+              <a:rPr lang="es-AR" sz="800" dirty="0">
+                <a:solidFill>
+                  <a:srgbClr val="000000"/>
+                </a:solidFill>
+                <a:effectLst/>
+                <a:latin typeface="Lucida Console" panose="020B0609040504020204" pitchFamily="49" charset="0"/>
+                <a:ea typeface="Arial" panose="020B0604020202020204" pitchFamily="34" charset="0"/>
+              </a:rPr>
+              <a:t>    </a:t>
+            </a:r>
+            <a:endParaRPr lang="es-AR" sz="1050" dirty="0">
+              <a:effectLst/>
+              <a:latin typeface="Arial" panose="020B0604020202020204" pitchFamily="34" charset="0"/>
+              <a:ea typeface="Arial" panose="020B0604020202020204" pitchFamily="34" charset="0"/>
+            </a:endParaRPr>
+          </a:p>
+          <a:p>
+            <a:pPr algn="just">
+              <a:lnSpc>
+                <a:spcPct val="115000"/>
+              </a:lnSpc>
+              <a:buNone/>
+            </a:pPr>
+            <a:r>
+              <a:rPr lang="es-AR" sz="800" dirty="0">
+                <a:solidFill>
+                  <a:srgbClr val="000000"/>
+                </a:solidFill>
+                <a:effectLst/>
+                <a:latin typeface="Lucida Console" panose="020B0609040504020204" pitchFamily="49" charset="0"/>
+                <a:ea typeface="Arial" panose="020B0604020202020204" pitchFamily="34" charset="0"/>
+              </a:rPr>
+              <a:t>FROM evoluciones_clinicas ec</a:t>
+            </a:r>
+            <a:endParaRPr lang="es-AR" sz="1050" dirty="0">
+              <a:effectLst/>
+              <a:latin typeface="Arial" panose="020B0604020202020204" pitchFamily="34" charset="0"/>
+              <a:ea typeface="Arial" panose="020B0604020202020204" pitchFamily="34" charset="0"/>
+            </a:endParaRPr>
+          </a:p>
+          <a:p>
+            <a:pPr algn="just">
+              <a:lnSpc>
+                <a:spcPct val="115000"/>
+              </a:lnSpc>
+              <a:buNone/>
+            </a:pPr>
+            <a:r>
+              <a:rPr lang="es-AR" sz="800" dirty="0">
+                <a:solidFill>
+                  <a:srgbClr val="000000"/>
+                </a:solidFill>
+                <a:effectLst/>
+                <a:latin typeface="Lucida Console" panose="020B0609040504020204" pitchFamily="49" charset="0"/>
+                <a:ea typeface="Arial" panose="020B0604020202020204" pitchFamily="34" charset="0"/>
+              </a:rPr>
+              <a:t>JOIN paciente p ON ec.id_paciente = p.id_paciente</a:t>
+            </a:r>
+            <a:endParaRPr lang="es-AR" sz="1050" dirty="0">
+              <a:effectLst/>
+              <a:latin typeface="Arial" panose="020B0604020202020204" pitchFamily="34" charset="0"/>
+              <a:ea typeface="Arial" panose="020B0604020202020204" pitchFamily="34" charset="0"/>
+            </a:endParaRPr>
+          </a:p>
+          <a:p>
+            <a:pPr algn="just">
+              <a:lnSpc>
+                <a:spcPct val="115000"/>
+              </a:lnSpc>
+              <a:buNone/>
+            </a:pPr>
+            <a:r>
+              <a:rPr lang="es-AR" sz="800" dirty="0">
+                <a:solidFill>
+                  <a:srgbClr val="000000"/>
+                </a:solidFill>
+                <a:effectLst/>
+                <a:latin typeface="Lucida Console" panose="020B0609040504020204" pitchFamily="49" charset="0"/>
+                <a:ea typeface="Arial" panose="020B0604020202020204" pitchFamily="34" charset="0"/>
+              </a:rPr>
+              <a:t>JOIN medico m ON ec.id_medico = m.id_medico;</a:t>
+            </a:r>
+            <a:endParaRPr lang="es-AR" sz="1050" dirty="0">
+              <a:effectLst/>
+              <a:latin typeface="Arial" panose="020B0604020202020204" pitchFamily="34" charset="0"/>
+              <a:ea typeface="Arial" panose="020B0604020202020204" pitchFamily="34" charset="0"/>
+            </a:endParaRPr>
+          </a:p>
+          <a:p>
+            <a:pPr algn="just">
+              <a:lnSpc>
+                <a:spcPct val="115000"/>
+              </a:lnSpc>
+            </a:pPr>
+            <a:r>
+              <a:rPr lang="es-ES" sz="800" dirty="0">
+                <a:effectLst/>
+                <a:latin typeface="Lucida Console" panose="020B0609040504020204" pitchFamily="49" charset="0"/>
+                <a:ea typeface="Arial" panose="020B0604020202020204" pitchFamily="34" charset="0"/>
+              </a:rPr>
+              <a:t> </a:t>
+            </a:r>
+            <a:endParaRPr lang="es-AR" sz="1050" dirty="0">
+              <a:effectLst/>
+              <a:latin typeface="Arial" panose="020B0604020202020204" pitchFamily="34" charset="0"/>
+              <a:ea typeface="Arial" panose="020B0604020202020204" pitchFamily="34" charset="0"/>
+            </a:endParaRPr>
+          </a:p>
+        </p:txBody>
+      </p:sp>
     </p:spTree>
     <p:extLst>
       <p:ext uri="{BB962C8B-B14F-4D97-AF65-F5344CB8AC3E}">

</xml_diff>